<commit_message>
add files for class today
</commit_message>
<xml_diff>
--- a/5. Simulating Data/SimulatingData.pptx
+++ b/5. Simulating Data/SimulatingData.pptx
@@ -5,7 +5,7 @@
     <p:sldMasterId id="2147483697" r:id="rId1"/>
   </p:sldMasterIdLst>
   <p:notesMasterIdLst>
-    <p:notesMasterId r:id="rId14"/>
+    <p:notesMasterId r:id="rId18"/>
   </p:notesMasterIdLst>
   <p:sldIdLst>
     <p:sldId id="256" r:id="rId2"/>
@@ -14,12 +14,16 @@
     <p:sldId id="262" r:id="rId5"/>
     <p:sldId id="263" r:id="rId6"/>
     <p:sldId id="257" r:id="rId7"/>
-    <p:sldId id="258" r:id="rId8"/>
-    <p:sldId id="259" r:id="rId9"/>
-    <p:sldId id="264" r:id="rId10"/>
-    <p:sldId id="265" r:id="rId11"/>
-    <p:sldId id="266" r:id="rId12"/>
-    <p:sldId id="267" r:id="rId13"/>
+    <p:sldId id="268" r:id="rId8"/>
+    <p:sldId id="258" r:id="rId9"/>
+    <p:sldId id="259" r:id="rId10"/>
+    <p:sldId id="269" r:id="rId11"/>
+    <p:sldId id="270" r:id="rId12"/>
+    <p:sldId id="271" r:id="rId13"/>
+    <p:sldId id="264" r:id="rId14"/>
+    <p:sldId id="265" r:id="rId15"/>
+    <p:sldId id="266" r:id="rId16"/>
+    <p:sldId id="267" r:id="rId17"/>
   </p:sldIdLst>
   <p:sldSz cx="9144000" cy="6858000" type="screen4x3"/>
   <p:notesSz cx="6858000" cy="9144000"/>
@@ -219,7 +223,7 @@
           <a:p>
             <a:fld id="{87596003-ACAB-CA4A-B0F1-B3D74D4B04C4}" type="datetimeFigureOut">
               <a:rPr lang="en-US" smtClean="0"/>
-              <a:t>10/22/19</a:t>
+              <a:t>10/18/21</a:t>
             </a:fld>
             <a:endParaRPr lang="en-US"/>
           </a:p>
@@ -733,7 +737,7 @@
           <a:p>
             <a:fld id="{9AB3A824-1A51-4B26-AD58-A6D8E14F6C04}" type="datetimeFigureOut">
               <a:rPr lang="en-US" smtClean="0"/>
-              <a:t>10/22/19</a:t>
+              <a:t>10/18/21</a:t>
             </a:fld>
             <a:endParaRPr lang="en-US" dirty="0"/>
           </a:p>
@@ -908,7 +912,7 @@
           <a:p>
             <a:fld id="{D857E33E-8B18-4087-B112-809917729534}" type="datetimeFigureOut">
               <a:rPr lang="en-US" smtClean="0"/>
-              <a:t>10/22/19</a:t>
+              <a:t>10/18/21</a:t>
             </a:fld>
             <a:endParaRPr lang="en-US" dirty="0"/>
           </a:p>
@@ -1093,7 +1097,7 @@
           <a:p>
             <a:fld id="{D3FFE419-2371-464F-8239-3959401C3561}" type="datetimeFigureOut">
               <a:rPr lang="en-US" smtClean="0"/>
-              <a:t>10/22/19</a:t>
+              <a:t>10/18/21</a:t>
             </a:fld>
             <a:endParaRPr lang="en-US" dirty="0"/>
           </a:p>
@@ -1210,7 +1214,7 @@
           </a:ln>
           <a:extLst>
             <a:ext uri="{91240B29-F687-4f45-9708-019B960494DF}">
-              <a14:hiddenLine xmlns:a14="http://schemas.microsoft.com/office/drawing/2010/main" xmlns="" w="9525">
+              <a14:hiddenLine xmlns="" xmlns:a14="http://schemas.microsoft.com/office/drawing/2010/main" w="9525">
                 <a:solidFill>
                   <a:srgbClr val="000000"/>
                 </a:solidFill>
@@ -1269,7 +1273,7 @@
           </a:ln>
           <a:extLst>
             <a:ext uri="{91240B29-F687-4f45-9708-019B960494DF}">
-              <a14:hiddenLine xmlns:a14="http://schemas.microsoft.com/office/drawing/2010/main" xmlns="" w="9525">
+              <a14:hiddenLine xmlns="" xmlns:a14="http://schemas.microsoft.com/office/drawing/2010/main" w="9525">
                 <a:solidFill>
                   <a:srgbClr val="000000"/>
                 </a:solidFill>
@@ -1317,7 +1321,7 @@
           <a:effectLst/>
           <a:extLst>
             <a:ext uri="{909E8E84-426E-40dd-AFC4-6F175D3DCCD1}">
-              <a14:hiddenFill xmlns:a14="http://schemas.microsoft.com/office/drawing/2010/main" xmlns="">
+              <a14:hiddenFill xmlns="" xmlns:a14="http://schemas.microsoft.com/office/drawing/2010/main">
                 <a:gradFill rotWithShape="0">
                   <a:gsLst>
                     <a:gs pos="0">
@@ -1332,7 +1336,7 @@
               </a14:hiddenFill>
             </a:ext>
             <a:ext uri="{91240B29-F687-4f45-9708-019B960494DF}">
-              <a14:hiddenLine xmlns:a14="http://schemas.microsoft.com/office/drawing/2010/main" xmlns="" w="9525">
+              <a14:hiddenLine xmlns="" xmlns:a14="http://schemas.microsoft.com/office/drawing/2010/main" w="9525">
                 <a:solidFill>
                   <a:schemeClr val="tx1"/>
                 </a:solidFill>
@@ -1342,7 +1346,7 @@
               </a14:hiddenLine>
             </a:ext>
             <a:ext uri="{AF507438-7753-43e0-B8FC-AC1667EBCBE1}">
-              <a14:hiddenEffects xmlns:a14="http://schemas.microsoft.com/office/drawing/2010/main" xmlns="">
+              <a14:hiddenEffects xmlns="" xmlns:a14="http://schemas.microsoft.com/office/drawing/2010/main">
                 <a:effectLst>
                   <a:outerShdw blurRad="63500" dist="38099" dir="2700000" algn="ctr" rotWithShape="0">
                     <a:schemeClr val="bg2">
@@ -1525,7 +1529,7 @@
           </a:ln>
           <a:extLst>
             <a:ext uri="{909E8E84-426E-40dd-AFC4-6F175D3DCCD1}">
-              <a14:hiddenFill xmlns:a14="http://schemas.microsoft.com/office/drawing/2010/main" xmlns="">
+              <a14:hiddenFill xmlns="" xmlns:a14="http://schemas.microsoft.com/office/drawing/2010/main">
                 <a:gradFill rotWithShape="0">
                   <a:gsLst>
                     <a:gs pos="0">
@@ -1540,7 +1544,7 @@
               </a14:hiddenFill>
             </a:ext>
             <a:ext uri="{91240B29-F687-4f45-9708-019B960494DF}">
-              <a14:hiddenLine xmlns:a14="http://schemas.microsoft.com/office/drawing/2010/main" xmlns="" w="9525">
+              <a14:hiddenLine xmlns="" xmlns:a14="http://schemas.microsoft.com/office/drawing/2010/main" w="9525">
                 <a:solidFill>
                   <a:srgbClr val="000000"/>
                 </a:solidFill>
@@ -1713,7 +1717,7 @@
           </a:ln>
           <a:extLst>
             <a:ext uri="{909E8E84-426E-40dd-AFC4-6F175D3DCCD1}">
-              <a14:hiddenFill xmlns:a14="http://schemas.microsoft.com/office/drawing/2010/main" xmlns="">
+              <a14:hiddenFill xmlns="" xmlns:a14="http://schemas.microsoft.com/office/drawing/2010/main">
                 <a:gradFill rotWithShape="0">
                   <a:gsLst>
                     <a:gs pos="0">
@@ -1728,7 +1732,7 @@
               </a14:hiddenFill>
             </a:ext>
             <a:ext uri="{91240B29-F687-4f45-9708-019B960494DF}">
-              <a14:hiddenLine xmlns:a14="http://schemas.microsoft.com/office/drawing/2010/main" xmlns="" w="9525">
+              <a14:hiddenLine xmlns="" xmlns:a14="http://schemas.microsoft.com/office/drawing/2010/main" w="9525">
                 <a:solidFill>
                   <a:srgbClr val="F6C932"/>
                 </a:solidFill>
@@ -1911,14 +1915,14 @@
           </a:ln>
           <a:extLst>
             <a:ext uri="{909E8E84-426E-40dd-AFC4-6F175D3DCCD1}">
-              <a14:hiddenFill xmlns:a14="http://schemas.microsoft.com/office/drawing/2010/main" xmlns="">
+              <a14:hiddenFill xmlns="" xmlns:a14="http://schemas.microsoft.com/office/drawing/2010/main">
                 <a:solidFill>
                   <a:srgbClr val="FFFFFF"/>
                 </a:solidFill>
               </a14:hiddenFill>
             </a:ext>
             <a:ext uri="{91240B29-F687-4f45-9708-019B960494DF}">
-              <a14:hiddenLine xmlns:a14="http://schemas.microsoft.com/office/drawing/2010/main" xmlns="" w="9525">
+              <a14:hiddenLine xmlns="" xmlns:a14="http://schemas.microsoft.com/office/drawing/2010/main" w="9525">
                 <a:solidFill>
                   <a:srgbClr val="000000"/>
                 </a:solidFill>
@@ -1953,7 +1957,7 @@
           <a:effectLst/>
           <a:extLst>
             <a:ext uri="{909E8E84-426E-40dd-AFC4-6F175D3DCCD1}">
-              <a14:hiddenFill xmlns:a14="http://schemas.microsoft.com/office/drawing/2010/main" xmlns="">
+              <a14:hiddenFill xmlns="" xmlns:a14="http://schemas.microsoft.com/office/drawing/2010/main">
                 <a:gradFill rotWithShape="0">
                   <a:gsLst>
                     <a:gs pos="0">
@@ -1968,7 +1972,7 @@
               </a14:hiddenFill>
             </a:ext>
             <a:ext uri="{91240B29-F687-4f45-9708-019B960494DF}">
-              <a14:hiddenLine xmlns:a14="http://schemas.microsoft.com/office/drawing/2010/main" xmlns="" w="9525">
+              <a14:hiddenLine xmlns="" xmlns:a14="http://schemas.microsoft.com/office/drawing/2010/main" w="9525">
                 <a:solidFill>
                   <a:schemeClr val="tx1"/>
                 </a:solidFill>
@@ -1978,7 +1982,7 @@
               </a14:hiddenLine>
             </a:ext>
             <a:ext uri="{AF507438-7753-43e0-B8FC-AC1667EBCBE1}">
-              <a14:hiddenEffects xmlns:a14="http://schemas.microsoft.com/office/drawing/2010/main" xmlns="">
+              <a14:hiddenEffects xmlns="" xmlns:a14="http://schemas.microsoft.com/office/drawing/2010/main">
                 <a:effectLst>
                   <a:outerShdw blurRad="63500" dist="38099" dir="2700000" algn="ctr" rotWithShape="0">
                     <a:schemeClr val="bg2">
@@ -2296,7 +2300,7 @@
           <a:p>
             <a:fld id="{97D162C4-EDD9-4389-A98B-B87ECEA2A816}" type="datetimeFigureOut">
               <a:rPr lang="en-US" smtClean="0"/>
-              <a:t>10/22/19</a:t>
+              <a:t>10/18/21</a:t>
             </a:fld>
             <a:endParaRPr lang="en-US" dirty="0"/>
           </a:p>
@@ -2569,7 +2573,7 @@
           <a:p>
             <a:fld id="{3E5059C3-6A89-4494-99FF-5A4D6FFD50EB}" type="datetimeFigureOut">
               <a:rPr lang="en-US" smtClean="0"/>
-              <a:t>10/22/19</a:t>
+              <a:t>10/18/21</a:t>
             </a:fld>
             <a:endParaRPr lang="en-US" dirty="0"/>
           </a:p>
@@ -2806,7 +2810,7 @@
           <a:p>
             <a:fld id="{CA954B2F-12DE-47F5-8894-472B206D2E1E}" type="datetimeFigureOut">
               <a:rPr lang="en-US" smtClean="0"/>
-              <a:t>10/22/19</a:t>
+              <a:t>10/18/21</a:t>
             </a:fld>
             <a:endParaRPr lang="en-US" dirty="0"/>
           </a:p>
@@ -3171,7 +3175,7 @@
             <a:fld id="{3CBC1C18-307B-4F68-A007-B5B542270E8D}" type="datetimeFigureOut">
               <a:rPr lang="en-US" smtClean="0"/>
               <a:pPr/>
-              <a:t>10/22/19</a:t>
+              <a:t>10/18/21</a:t>
             </a:fld>
             <a:endParaRPr lang="en-US" dirty="0"/>
           </a:p>
@@ -3318,7 +3322,7 @@
           <a:p>
             <a:fld id="{1FAF3416-4057-4DAA-829D-4CA07428D088}" type="datetimeFigureOut">
               <a:rPr lang="en-US" smtClean="0"/>
-              <a:t>10/22/19</a:t>
+              <a:t>10/18/21</a:t>
             </a:fld>
             <a:endParaRPr lang="en-US" dirty="0"/>
           </a:p>
@@ -3418,7 +3422,7 @@
           <a:p>
             <a:fld id="{921D9284-D300-4297-87F7-E791DCC15DB1}" type="datetimeFigureOut">
               <a:rPr lang="en-US" smtClean="0"/>
-              <a:t>10/22/19</a:t>
+              <a:t>10/18/21</a:t>
             </a:fld>
             <a:endParaRPr lang="en-US" dirty="0"/>
           </a:p>
@@ -3780,7 +3784,7 @@
           <a:p>
             <a:fld id="{37D525BB-DA17-4BA0-B3C8-3AC3ABC827E6}" type="datetimeFigureOut">
               <a:rPr lang="en-US" smtClean="0"/>
-              <a:t>10/22/19</a:t>
+              <a:t>10/18/21</a:t>
             </a:fld>
             <a:endParaRPr lang="en-US" dirty="0"/>
           </a:p>
@@ -4144,7 +4148,7 @@
           <a:p>
             <a:fld id="{B16C4C9A-3960-41CF-A4E9-2A8FB932454B}" type="datetimeFigureOut">
               <a:rPr lang="en-US" smtClean="0"/>
-              <a:t>10/22/19</a:t>
+              <a:t>10/18/21</a:t>
             </a:fld>
             <a:endParaRPr lang="en-US" dirty="0"/>
           </a:p>
@@ -4394,7 +4398,7 @@
             <a:fld id="{3CBC1C18-307B-4F68-A007-B5B542270E8D}" type="datetimeFigureOut">
               <a:rPr lang="en-US" smtClean="0"/>
               <a:pPr/>
-              <a:t>10/22/19</a:t>
+              <a:t>10/18/21</a:t>
             </a:fld>
             <a:endParaRPr lang="en-US" dirty="0"/>
           </a:p>
@@ -4879,7 +4883,7 @@
             </a:br>
             <a:r>
               <a:rPr lang="en-US" dirty="0"/>
-              <a:t>22 October 2019</a:t>
+              <a:t>18 October 2021</a:t>
             </a:r>
           </a:p>
         </p:txBody>
@@ -4974,84 +4978,712 @@
       </p:grpSpPr>
       <p:sp>
         <p:nvSpPr>
-          <p:cNvPr id="2" name="Title 1"/>
-          <p:cNvSpPr>
-            <a:spLocks noGrp="1"/>
-          </p:cNvSpPr>
-          <p:nvPr>
-            <p:ph type="title"/>
-          </p:nvPr>
-        </p:nvSpPr>
-        <p:spPr/>
-        <p:txBody>
-          <a:bodyPr/>
+          <p:cNvPr id="4" name="Rectangle 1">
+            <a:extLst>
+              <a:ext uri="{FF2B5EF4-FFF2-40B4-BE49-F238E27FC236}">
+                <a16:creationId xmlns:a16="http://schemas.microsoft.com/office/drawing/2014/main" id="{E75B82B4-EAB3-F044-8F7F-FBB0A896356B}"/>
+              </a:ext>
+            </a:extLst>
+          </p:cNvPr>
+          <p:cNvSpPr>
+            <a:spLocks noChangeArrowheads="1"/>
+          </p:cNvSpPr>
+          <p:nvPr/>
+        </p:nvSpPr>
+        <p:spPr bwMode="auto">
+          <a:xfrm>
+            <a:off x="762000" y="422998"/>
+            <a:ext cx="7625862" cy="2108221"/>
+          </a:xfrm>
+          <a:prstGeom prst="rect">
+            <a:avLst/>
+          </a:prstGeom>
+          <a:solidFill>
+            <a:srgbClr val="E6E6E6"/>
+          </a:solidFill>
+          <a:ln>
+            <a:noFill/>
+          </a:ln>
+          <a:effectLst/>
+          <a:extLst>
+            <a:ext uri="{91240B29-F687-4F45-9708-019B960494DF}">
+              <a14:hiddenLine xmlns:a14="http://schemas.microsoft.com/office/drawing/2010/main" w="9525">
+                <a:solidFill>
+                  <a:schemeClr val="tx1"/>
+                </a:solidFill>
+                <a:miter lim="800000"/>
+                <a:headEnd/>
+                <a:tailEnd/>
+              </a14:hiddenLine>
+            </a:ext>
+            <a:ext uri="{AF507438-7753-43E0-B8FC-AC1667EBCBE1}">
+              <a14:hiddenEffects xmlns:a14="http://schemas.microsoft.com/office/drawing/2010/main">
+                <a:effectLst>
+                  <a:outerShdw dist="35921" dir="2700000" algn="ctr" rotWithShape="0">
+                    <a:schemeClr val="bg2"/>
+                  </a:outerShdw>
+                </a:effectLst>
+              </a14:hiddenEffects>
+            </a:ext>
+          </a:extLst>
+        </p:spPr>
+        <p:txBody>
+          <a:bodyPr vert="horz" wrap="square" lIns="0" tIns="0" rIns="0" bIns="152352" numCol="1" anchor="ctr" anchorCtr="0" compatLnSpc="1">
+            <a:prstTxWarp prst="textNoShape">
+              <a:avLst/>
+            </a:prstTxWarp>
+            <a:spAutoFit/>
+          </a:bodyPr>
           <a:lstStyle/>
           <a:p>
-            <a:r>
-              <a:rPr lang="en-US" dirty="0"/>
-              <a:t>rep()</a:t>
-            </a:r>
-          </a:p>
-        </p:txBody>
-      </p:sp>
-      <p:sp>
-        <p:nvSpPr>
-          <p:cNvPr id="3" name="Content Placeholder 2"/>
-          <p:cNvSpPr>
-            <a:spLocks noGrp="1"/>
-          </p:cNvSpPr>
-          <p:nvPr>
-            <p:ph idx="1"/>
-          </p:nvPr>
-        </p:nvSpPr>
-        <p:spPr/>
-        <p:txBody>
-          <a:bodyPr/>
-          <a:lstStyle/>
-          <a:p>
-            <a:pPr lvl="1"/>
-            <a:r>
-              <a:rPr lang="en-US" dirty="0"/>
-              <a:t>Use c(“a”, “b”, “c”.....) </a:t>
-            </a:r>
-          </a:p>
-          <a:p>
-            <a:pPr lvl="1"/>
-            <a:r>
-              <a:rPr lang="en-US" dirty="0"/>
-              <a:t>Each = # of times you rep each one</a:t>
-            </a:r>
-          </a:p>
-          <a:p>
-            <a:pPr lvl="1"/>
-            <a:r>
-              <a:rPr lang="en-US" dirty="0"/>
-              <a:t>Times = number of times you rep the whole vector</a:t>
-            </a:r>
-          </a:p>
-          <a:p>
-            <a:pPr lvl="1"/>
-            <a:r>
-              <a:rPr lang="en-US" dirty="0"/>
-              <a:t>Length = replicate until you get a vector of this length</a:t>
-            </a:r>
-          </a:p>
-          <a:p>
-            <a:pPr lvl="1"/>
-            <a:r>
-              <a:rPr lang="en-US" dirty="0"/>
-              <a:t>Need to use factor() around rep function to create a factor. </a:t>
-            </a:r>
-          </a:p>
-          <a:p>
-            <a:endParaRPr lang="en-US" dirty="0"/>
-          </a:p>
-        </p:txBody>
-      </p:sp>
+            <a:pPr marL="0" marR="0" lvl="0" indent="0" algn="l" defTabSz="914400" rtl="0" eaLnBrk="0" fontAlgn="base" latinLnBrk="0" hangingPunct="0">
+              <a:lnSpc>
+                <a:spcPct val="100000"/>
+              </a:lnSpc>
+              <a:spcBef>
+                <a:spcPct val="0"/>
+              </a:spcBef>
+              <a:spcAft>
+                <a:spcPct val="0"/>
+              </a:spcAft>
+              <a:buClrTx/>
+              <a:buSzTx/>
+              <a:buFontTx/>
+              <a:buNone/>
+              <a:tabLst/>
+            </a:pPr>
+            <a:r>
+              <a:rPr kumimoji="0" lang="en-US" altLang="en-US" sz="3300" b="1" i="0" u="none" strike="noStrike" cap="none" normalizeH="0" baseline="0" dirty="0">
+                <a:ln>
+                  <a:noFill/>
+                </a:ln>
+                <a:solidFill>
+                  <a:srgbClr val="515151"/>
+                </a:solidFill>
+                <a:effectLst/>
+                <a:latin typeface="inherit"/>
+              </a:rPr>
+              <a:t>Random Data in R: </a:t>
+            </a:r>
+            <a:r>
+              <a:rPr kumimoji="0" lang="en-US" altLang="en-US" sz="3300" b="1" i="0" u="none" strike="noStrike" cap="none" normalizeH="0" baseline="0" dirty="0" err="1">
+                <a:ln>
+                  <a:noFill/>
+                </a:ln>
+                <a:solidFill>
+                  <a:srgbClr val="515151"/>
+                </a:solidFill>
+                <a:effectLst/>
+                <a:latin typeface="inherit"/>
+              </a:rPr>
+              <a:t>rnorm</a:t>
+            </a:r>
+            <a:endParaRPr kumimoji="0" lang="en-US" altLang="en-US" sz="3300" b="1" i="0" u="none" strike="noStrike" cap="none" normalizeH="0" baseline="0" dirty="0">
+              <a:ln>
+                <a:noFill/>
+              </a:ln>
+              <a:solidFill>
+                <a:srgbClr val="515151"/>
+              </a:solidFill>
+              <a:effectLst/>
+              <a:latin typeface="inherit"/>
+            </a:endParaRPr>
+          </a:p>
+          <a:p>
+            <a:pPr marL="0" marR="0" lvl="0" indent="0" algn="l" defTabSz="914400" rtl="0" eaLnBrk="0" fontAlgn="base" latinLnBrk="0" hangingPunct="0">
+              <a:lnSpc>
+                <a:spcPct val="100000"/>
+              </a:lnSpc>
+              <a:spcBef>
+                <a:spcPct val="0"/>
+              </a:spcBef>
+              <a:spcAft>
+                <a:spcPct val="0"/>
+              </a:spcAft>
+              <a:buClrTx/>
+              <a:buSzTx/>
+              <a:buFontTx/>
+              <a:buNone/>
+              <a:tabLst/>
+            </a:pPr>
+            <a:r>
+              <a:rPr kumimoji="0" lang="en-US" altLang="en-US" sz="1500" b="0" i="0" u="none" strike="noStrike" cap="none" normalizeH="0" baseline="0" dirty="0" err="1">
+                <a:ln>
+                  <a:noFill/>
+                </a:ln>
+                <a:solidFill>
+                  <a:srgbClr val="515151"/>
+                </a:solidFill>
+                <a:effectLst/>
+                <a:latin typeface="inherit"/>
+              </a:rPr>
+              <a:t>data.frame</a:t>
+            </a:r>
+            <a:r>
+              <a:rPr kumimoji="0" lang="en-US" altLang="en-US" sz="1500" b="0" i="0" u="none" strike="noStrike" cap="none" normalizeH="0" baseline="0" dirty="0">
+                <a:ln>
+                  <a:noFill/>
+                </a:ln>
+                <a:solidFill>
+                  <a:srgbClr val="515151"/>
+                </a:solidFill>
+                <a:effectLst/>
+                <a:latin typeface="inherit"/>
+              </a:rPr>
+              <a:t>(</a:t>
+            </a:r>
+            <a:r>
+              <a:rPr kumimoji="0" lang="en-US" altLang="en-US" sz="1500" b="0" i="0" u="none" strike="noStrike" cap="none" normalizeH="0" baseline="0" dirty="0" err="1">
+                <a:ln>
+                  <a:noFill/>
+                </a:ln>
+                <a:solidFill>
+                  <a:srgbClr val="515151"/>
+                </a:solidFill>
+                <a:effectLst/>
+                <a:latin typeface="inherit"/>
+              </a:rPr>
+              <a:t>r_sample</a:t>
+            </a:r>
+            <a:r>
+              <a:rPr kumimoji="0" lang="en-US" altLang="en-US" sz="1500" b="0" i="0" u="none" strike="noStrike" cap="none" normalizeH="0" baseline="0" dirty="0">
+                <a:ln>
+                  <a:noFill/>
+                </a:ln>
+                <a:solidFill>
+                  <a:srgbClr val="515151"/>
+                </a:solidFill>
+                <a:effectLst/>
+                <a:latin typeface="inherit"/>
+              </a:rPr>
+              <a:t> = </a:t>
+            </a:r>
+            <a:r>
+              <a:rPr kumimoji="0" lang="en-US" altLang="en-US" sz="1500" b="0" i="0" u="none" strike="noStrike" cap="none" normalizeH="0" baseline="0" dirty="0" err="1">
+                <a:ln>
+                  <a:noFill/>
+                </a:ln>
+                <a:solidFill>
+                  <a:srgbClr val="515151"/>
+                </a:solidFill>
+                <a:effectLst/>
+                <a:latin typeface="inherit"/>
+              </a:rPr>
+              <a:t>rnorm</a:t>
+            </a:r>
+            <a:r>
+              <a:rPr kumimoji="0" lang="en-US" altLang="en-US" sz="1500" b="0" i="0" u="none" strike="noStrike" cap="none" normalizeH="0" baseline="0" dirty="0">
+                <a:ln>
+                  <a:noFill/>
+                </a:ln>
+                <a:solidFill>
+                  <a:srgbClr val="515151"/>
+                </a:solidFill>
+                <a:effectLst/>
+                <a:latin typeface="inherit"/>
+              </a:rPr>
+              <a:t>(n = </a:t>
+            </a:r>
+            <a:r>
+              <a:rPr kumimoji="0" lang="en-US" altLang="en-US" sz="1500" b="0" i="0" u="none" strike="noStrike" cap="none" normalizeH="0" baseline="0" dirty="0">
+                <a:ln>
+                  <a:noFill/>
+                </a:ln>
+                <a:solidFill>
+                  <a:srgbClr val="7F0000"/>
+                </a:solidFill>
+                <a:effectLst/>
+                <a:latin typeface="inherit"/>
+              </a:rPr>
+              <a:t>10000</a:t>
+            </a:r>
+            <a:r>
+              <a:rPr kumimoji="0" lang="en-US" altLang="en-US" sz="1500" b="0" i="0" u="none" strike="noStrike" cap="none" normalizeH="0" baseline="0" dirty="0">
+                <a:ln>
+                  <a:noFill/>
+                </a:ln>
+                <a:solidFill>
+                  <a:srgbClr val="515151"/>
+                </a:solidFill>
+                <a:effectLst/>
+                <a:latin typeface="inherit"/>
+              </a:rPr>
+              <a:t>, mean = </a:t>
+            </a:r>
+            <a:r>
+              <a:rPr kumimoji="0" lang="en-US" altLang="en-US" sz="1500" b="0" i="0" u="none" strike="noStrike" cap="none" normalizeH="0" baseline="0" dirty="0">
+                <a:ln>
+                  <a:noFill/>
+                </a:ln>
+                <a:solidFill>
+                  <a:srgbClr val="7F0000"/>
+                </a:solidFill>
+                <a:effectLst/>
+                <a:latin typeface="inherit"/>
+              </a:rPr>
+              <a:t>1000</a:t>
+            </a:r>
+            <a:r>
+              <a:rPr kumimoji="0" lang="en-US" altLang="en-US" sz="1500" b="0" i="0" u="none" strike="noStrike" cap="none" normalizeH="0" baseline="0" dirty="0">
+                <a:ln>
+                  <a:noFill/>
+                </a:ln>
+                <a:solidFill>
+                  <a:srgbClr val="515151"/>
+                </a:solidFill>
+                <a:effectLst/>
+                <a:latin typeface="inherit"/>
+              </a:rPr>
+              <a:t>, </a:t>
+            </a:r>
+            <a:r>
+              <a:rPr kumimoji="0" lang="en-US" altLang="en-US" sz="1500" b="0" i="0" u="none" strike="noStrike" cap="none" normalizeH="0" baseline="0" dirty="0" err="1">
+                <a:ln>
+                  <a:noFill/>
+                </a:ln>
+                <a:solidFill>
+                  <a:srgbClr val="515151"/>
+                </a:solidFill>
+                <a:effectLst/>
+                <a:latin typeface="inherit"/>
+              </a:rPr>
+              <a:t>sd</a:t>
+            </a:r>
+            <a:r>
+              <a:rPr kumimoji="0" lang="en-US" altLang="en-US" sz="1500" b="0" i="0" u="none" strike="noStrike" cap="none" normalizeH="0" baseline="0" dirty="0">
+                <a:ln>
+                  <a:noFill/>
+                </a:ln>
+                <a:solidFill>
+                  <a:srgbClr val="515151"/>
+                </a:solidFill>
+                <a:effectLst/>
+                <a:latin typeface="inherit"/>
+              </a:rPr>
+              <a:t> = </a:t>
+            </a:r>
+            <a:r>
+              <a:rPr kumimoji="0" lang="en-US" altLang="en-US" sz="1500" b="0" i="0" u="none" strike="noStrike" cap="none" normalizeH="0" baseline="0" dirty="0">
+                <a:ln>
+                  <a:noFill/>
+                </a:ln>
+                <a:solidFill>
+                  <a:srgbClr val="7F0000"/>
+                </a:solidFill>
+                <a:effectLst/>
+                <a:latin typeface="inherit"/>
+              </a:rPr>
+              <a:t>250</a:t>
+            </a:r>
+            <a:r>
+              <a:rPr kumimoji="0" lang="en-US" altLang="en-US" sz="1500" b="0" i="0" u="none" strike="noStrike" cap="none" normalizeH="0" baseline="0" dirty="0">
+                <a:ln>
+                  <a:noFill/>
+                </a:ln>
+                <a:solidFill>
+                  <a:srgbClr val="515151"/>
+                </a:solidFill>
+                <a:effectLst/>
+                <a:latin typeface="inherit"/>
+              </a:rPr>
+              <a:t>)) %&gt;% </a:t>
+            </a:r>
+          </a:p>
+          <a:p>
+            <a:pPr lvl="1" defTabSz="914400" eaLnBrk="0" fontAlgn="base" hangingPunct="0">
+              <a:spcBef>
+                <a:spcPct val="0"/>
+              </a:spcBef>
+              <a:spcAft>
+                <a:spcPct val="0"/>
+              </a:spcAft>
+            </a:pPr>
+            <a:r>
+              <a:rPr kumimoji="0" lang="en-US" altLang="en-US" sz="1500" b="0" i="0" u="none" strike="noStrike" cap="none" normalizeH="0" baseline="0" dirty="0" err="1">
+                <a:ln>
+                  <a:noFill/>
+                </a:ln>
+                <a:solidFill>
+                  <a:srgbClr val="515151"/>
+                </a:solidFill>
+                <a:effectLst/>
+                <a:latin typeface="inherit"/>
+              </a:rPr>
+              <a:t>ggplot</a:t>
+            </a:r>
+            <a:r>
+              <a:rPr kumimoji="0" lang="en-US" altLang="en-US" sz="1500" b="0" i="0" u="none" strike="noStrike" cap="none" normalizeH="0" baseline="0" dirty="0">
+                <a:ln>
+                  <a:noFill/>
+                </a:ln>
+                <a:solidFill>
+                  <a:srgbClr val="515151"/>
+                </a:solidFill>
+                <a:effectLst/>
+                <a:latin typeface="inherit"/>
+              </a:rPr>
+              <a:t>(</a:t>
+            </a:r>
+            <a:r>
+              <a:rPr kumimoji="0" lang="en-US" altLang="en-US" sz="1500" b="0" i="0" u="none" strike="noStrike" cap="none" normalizeH="0" baseline="0" dirty="0" err="1">
+                <a:ln>
+                  <a:noFill/>
+                </a:ln>
+                <a:solidFill>
+                  <a:srgbClr val="515151"/>
+                </a:solidFill>
+                <a:effectLst/>
+                <a:latin typeface="inherit"/>
+              </a:rPr>
+              <a:t>aes</a:t>
+            </a:r>
+            <a:r>
+              <a:rPr kumimoji="0" lang="en-US" altLang="en-US" sz="1500" b="0" i="0" u="none" strike="noStrike" cap="none" normalizeH="0" baseline="0" dirty="0">
+                <a:ln>
+                  <a:noFill/>
+                </a:ln>
+                <a:solidFill>
+                  <a:srgbClr val="515151"/>
+                </a:solidFill>
+                <a:effectLst/>
+                <a:latin typeface="inherit"/>
+              </a:rPr>
+              <a:t>(x = </a:t>
+            </a:r>
+            <a:r>
+              <a:rPr kumimoji="0" lang="en-US" altLang="en-US" sz="1500" b="0" i="0" u="none" strike="noStrike" cap="none" normalizeH="0" baseline="0" dirty="0" err="1">
+                <a:ln>
+                  <a:noFill/>
+                </a:ln>
+                <a:solidFill>
+                  <a:srgbClr val="515151"/>
+                </a:solidFill>
+                <a:effectLst/>
+                <a:latin typeface="inherit"/>
+              </a:rPr>
+              <a:t>r_sample</a:t>
+            </a:r>
+            <a:r>
+              <a:rPr kumimoji="0" lang="en-US" altLang="en-US" sz="1500" b="0" i="0" u="none" strike="noStrike" cap="none" normalizeH="0" baseline="0" dirty="0">
+                <a:ln>
+                  <a:noFill/>
+                </a:ln>
+                <a:solidFill>
+                  <a:srgbClr val="515151"/>
+                </a:solidFill>
+                <a:effectLst/>
+                <a:latin typeface="inherit"/>
+              </a:rPr>
+              <a:t>)) + </a:t>
+            </a:r>
+          </a:p>
+          <a:p>
+            <a:pPr lvl="2" defTabSz="914400" eaLnBrk="0" fontAlgn="base" hangingPunct="0">
+              <a:spcBef>
+                <a:spcPct val="0"/>
+              </a:spcBef>
+              <a:spcAft>
+                <a:spcPct val="0"/>
+              </a:spcAft>
+            </a:pPr>
+            <a:r>
+              <a:rPr kumimoji="0" lang="en-US" altLang="en-US" sz="1500" b="0" i="0" u="none" strike="noStrike" cap="none" normalizeH="0" baseline="0" dirty="0" err="1">
+                <a:ln>
+                  <a:noFill/>
+                </a:ln>
+                <a:solidFill>
+                  <a:srgbClr val="515151"/>
+                </a:solidFill>
+                <a:effectLst/>
+                <a:latin typeface="inherit"/>
+              </a:rPr>
+              <a:t>geom_histogram</a:t>
+            </a:r>
+            <a:r>
+              <a:rPr kumimoji="0" lang="en-US" altLang="en-US" sz="1500" b="0" i="0" u="none" strike="noStrike" cap="none" normalizeH="0" baseline="0" dirty="0">
+                <a:ln>
+                  <a:noFill/>
+                </a:ln>
+                <a:solidFill>
+                  <a:srgbClr val="515151"/>
+                </a:solidFill>
+                <a:effectLst/>
+                <a:latin typeface="inherit"/>
+              </a:rPr>
+              <a:t>(bins = </a:t>
+            </a:r>
+            <a:r>
+              <a:rPr kumimoji="0" lang="en-US" altLang="en-US" sz="1500" b="0" i="0" u="none" strike="noStrike" cap="none" normalizeH="0" baseline="0" dirty="0">
+                <a:ln>
+                  <a:noFill/>
+                </a:ln>
+                <a:solidFill>
+                  <a:srgbClr val="7F0000"/>
+                </a:solidFill>
+                <a:effectLst/>
+                <a:latin typeface="inherit"/>
+              </a:rPr>
+              <a:t>300</a:t>
+            </a:r>
+            <a:r>
+              <a:rPr kumimoji="0" lang="en-US" altLang="en-US" sz="1500" b="0" i="0" u="none" strike="noStrike" cap="none" normalizeH="0" baseline="0" dirty="0">
+                <a:ln>
+                  <a:noFill/>
+                </a:ln>
+                <a:solidFill>
+                  <a:srgbClr val="515151"/>
+                </a:solidFill>
+                <a:effectLst/>
+                <a:latin typeface="inherit"/>
+              </a:rPr>
+              <a:t>) + </a:t>
+            </a:r>
+          </a:p>
+          <a:p>
+            <a:pPr lvl="2" defTabSz="914400" eaLnBrk="0" fontAlgn="base" hangingPunct="0">
+              <a:spcBef>
+                <a:spcPct val="0"/>
+              </a:spcBef>
+              <a:spcAft>
+                <a:spcPct val="0"/>
+              </a:spcAft>
+            </a:pPr>
+            <a:r>
+              <a:rPr kumimoji="0" lang="en-US" altLang="en-US" sz="1500" b="0" i="0" u="none" strike="noStrike" cap="none" normalizeH="0" baseline="0" dirty="0" err="1">
+                <a:ln>
+                  <a:noFill/>
+                </a:ln>
+                <a:solidFill>
+                  <a:srgbClr val="515151"/>
+                </a:solidFill>
+                <a:effectLst/>
+                <a:latin typeface="inherit"/>
+              </a:rPr>
+              <a:t>geom_vline</a:t>
+            </a:r>
+            <a:r>
+              <a:rPr kumimoji="0" lang="en-US" altLang="en-US" sz="1500" b="0" i="0" u="none" strike="noStrike" cap="none" normalizeH="0" baseline="0" dirty="0">
+                <a:ln>
+                  <a:noFill/>
+                </a:ln>
+                <a:solidFill>
+                  <a:srgbClr val="515151"/>
+                </a:solidFill>
+                <a:effectLst/>
+                <a:latin typeface="inherit"/>
+              </a:rPr>
+              <a:t>(</a:t>
+            </a:r>
+            <a:r>
+              <a:rPr kumimoji="0" lang="en-US" altLang="en-US" sz="1500" b="0" i="0" u="none" strike="noStrike" cap="none" normalizeH="0" baseline="0" dirty="0" err="1">
+                <a:ln>
+                  <a:noFill/>
+                </a:ln>
+                <a:solidFill>
+                  <a:srgbClr val="515151"/>
+                </a:solidFill>
+                <a:effectLst/>
+                <a:latin typeface="inherit"/>
+              </a:rPr>
+              <a:t>xintercept</a:t>
+            </a:r>
+            <a:r>
+              <a:rPr kumimoji="0" lang="en-US" altLang="en-US" sz="1500" b="0" i="0" u="none" strike="noStrike" cap="none" normalizeH="0" baseline="0" dirty="0">
+                <a:ln>
+                  <a:noFill/>
+                </a:ln>
+                <a:solidFill>
+                  <a:srgbClr val="515151"/>
+                </a:solidFill>
+                <a:effectLst/>
+                <a:latin typeface="inherit"/>
+              </a:rPr>
+              <a:t> = </a:t>
+            </a:r>
+            <a:r>
+              <a:rPr kumimoji="0" lang="en-US" altLang="en-US" sz="1500" b="0" i="0" u="none" strike="noStrike" cap="none" normalizeH="0" baseline="0" dirty="0">
+                <a:ln>
+                  <a:noFill/>
+                </a:ln>
+                <a:solidFill>
+                  <a:srgbClr val="7F0000"/>
+                </a:solidFill>
+                <a:effectLst/>
+                <a:latin typeface="inherit"/>
+              </a:rPr>
+              <a:t>1000</a:t>
+            </a:r>
+            <a:r>
+              <a:rPr kumimoji="0" lang="en-US" altLang="en-US" sz="1500" b="0" i="0" u="none" strike="noStrike" cap="none" normalizeH="0" baseline="0" dirty="0">
+                <a:ln>
+                  <a:noFill/>
+                </a:ln>
+                <a:solidFill>
+                  <a:srgbClr val="515151"/>
+                </a:solidFill>
+                <a:effectLst/>
+                <a:latin typeface="inherit"/>
+              </a:rPr>
+              <a:t>, color = </a:t>
+            </a:r>
+            <a:r>
+              <a:rPr kumimoji="0" lang="en-US" altLang="en-US" sz="1500" b="0" i="0" u="none" strike="noStrike" cap="none" normalizeH="0" baseline="0" dirty="0">
+                <a:ln>
+                  <a:noFill/>
+                </a:ln>
+                <a:solidFill>
+                  <a:srgbClr val="009F5D"/>
+                </a:solidFill>
+                <a:effectLst/>
+                <a:latin typeface="inherit"/>
+              </a:rPr>
+              <a:t>'red'</a:t>
+            </a:r>
+            <a:r>
+              <a:rPr kumimoji="0" lang="en-US" altLang="en-US" sz="1500" b="0" i="0" u="none" strike="noStrike" cap="none" normalizeH="0" baseline="0" dirty="0">
+                <a:ln>
+                  <a:noFill/>
+                </a:ln>
+                <a:solidFill>
+                  <a:srgbClr val="515151"/>
+                </a:solidFill>
+                <a:effectLst/>
+                <a:latin typeface="inherit"/>
+              </a:rPr>
+              <a:t>) + </a:t>
+            </a:r>
+          </a:p>
+          <a:p>
+            <a:pPr lvl="2" defTabSz="914400" eaLnBrk="0" fontAlgn="base" hangingPunct="0">
+              <a:spcBef>
+                <a:spcPct val="0"/>
+              </a:spcBef>
+              <a:spcAft>
+                <a:spcPct val="0"/>
+              </a:spcAft>
+            </a:pPr>
+            <a:r>
+              <a:rPr kumimoji="0" lang="en-US" altLang="en-US" sz="1500" b="0" i="0" u="none" strike="noStrike" cap="none" normalizeH="0" baseline="0" dirty="0" err="1">
+                <a:ln>
+                  <a:noFill/>
+                </a:ln>
+                <a:solidFill>
+                  <a:srgbClr val="515151"/>
+                </a:solidFill>
+                <a:effectLst/>
+                <a:latin typeface="inherit"/>
+              </a:rPr>
+              <a:t>theme_linedraw</a:t>
+            </a:r>
+            <a:r>
+              <a:rPr kumimoji="0" lang="en-US" altLang="en-US" sz="1500" b="0" i="0" u="none" strike="noStrike" cap="none" normalizeH="0" baseline="0" dirty="0">
+                <a:ln>
+                  <a:noFill/>
+                </a:ln>
+                <a:solidFill>
+                  <a:srgbClr val="515151"/>
+                </a:solidFill>
+                <a:effectLst/>
+                <a:latin typeface="inherit"/>
+              </a:rPr>
+              <a:t>()</a:t>
+            </a:r>
+            <a:endParaRPr kumimoji="0" lang="en-US" altLang="en-US" sz="800" b="0" i="0" u="none" strike="noStrike" cap="none" normalizeH="0" baseline="0" dirty="0">
+              <a:ln>
+                <a:noFill/>
+              </a:ln>
+              <a:solidFill>
+                <a:schemeClr val="tx1"/>
+              </a:solidFill>
+              <a:effectLst/>
+            </a:endParaRPr>
+          </a:p>
+          <a:p>
+            <a:pPr lvl="2" defTabSz="914400" eaLnBrk="0" fontAlgn="base" hangingPunct="0">
+              <a:spcBef>
+                <a:spcPct val="0"/>
+              </a:spcBef>
+              <a:spcAft>
+                <a:spcPct val="0"/>
+              </a:spcAft>
+            </a:pPr>
+            <a:r>
+              <a:rPr kumimoji="0" lang="en-US" altLang="en-US" sz="1900" b="0" i="0" u="none" strike="noStrike" cap="none" normalizeH="0" baseline="0" dirty="0">
+                <a:ln>
+                  <a:noFill/>
+                </a:ln>
+                <a:solidFill>
+                  <a:schemeClr val="tx1"/>
+                </a:solidFill>
+                <a:effectLst/>
+                <a:latin typeface="inherit"/>
+              </a:rPr>
+              <a:t>  </a:t>
+            </a:r>
+            <a:endParaRPr kumimoji="0" lang="en-US" altLang="en-US" sz="23600" b="0" i="0" u="none" strike="noStrike" cap="none" normalizeH="0" baseline="0" dirty="0">
+              <a:ln>
+                <a:noFill/>
+              </a:ln>
+              <a:solidFill>
+                <a:schemeClr val="tx1"/>
+              </a:solidFill>
+              <a:effectLst/>
+              <a:latin typeface="inherit"/>
+            </a:endParaRPr>
+          </a:p>
+        </p:txBody>
+      </p:sp>
+      <p:pic>
+        <p:nvPicPr>
+          <p:cNvPr id="1026" name="Picture 2">
+            <a:extLst>
+              <a:ext uri="{FF2B5EF4-FFF2-40B4-BE49-F238E27FC236}">
+                <a16:creationId xmlns:a16="http://schemas.microsoft.com/office/drawing/2014/main" id="{3C518D2A-4525-D044-A2F3-3DC03D0B265B}"/>
+              </a:ext>
+            </a:extLst>
+          </p:cNvPr>
+          <p:cNvPicPr>
+            <a:picLocks noChangeAspect="1" noChangeArrowheads="1"/>
+          </p:cNvPicPr>
+          <p:nvPr/>
+        </p:nvPicPr>
+        <p:blipFill>
+          <a:blip r:embed="rId2">
+            <a:extLst>
+              <a:ext uri="{28A0092B-C50C-407E-A947-70E740481C1C}">
+                <a14:useLocalDpi xmlns:a14="http://schemas.microsoft.com/office/drawing/2010/main" val="0"/>
+              </a:ext>
+            </a:extLst>
+          </a:blip>
+          <a:srcRect/>
+          <a:stretch>
+            <a:fillRect/>
+          </a:stretch>
+        </p:blipFill>
+        <p:spPr bwMode="auto">
+          <a:xfrm>
+            <a:off x="1524000" y="3098800"/>
+            <a:ext cx="6096000" cy="3759200"/>
+          </a:xfrm>
+          <a:prstGeom prst="rect">
+            <a:avLst/>
+          </a:prstGeom>
+          <a:noFill/>
+          <a:extLst>
+            <a:ext uri="{909E8E84-426E-40DD-AFC4-6F175D3DCCD1}">
+              <a14:hiddenFill xmlns:a14="http://schemas.microsoft.com/office/drawing/2010/main">
+                <a:solidFill>
+                  <a:srgbClr val="FFFFFF"/>
+                </a:solidFill>
+              </a14:hiddenFill>
+            </a:ext>
+          </a:extLst>
+        </p:spPr>
+      </p:pic>
     </p:spTree>
     <p:extLst>
       <p:ext uri="{BB962C8B-B14F-4D97-AF65-F5344CB8AC3E}">
-        <p14:creationId xmlns:p14="http://schemas.microsoft.com/office/powerpoint/2010/main" val="3700533529"/>
+        <p14:creationId xmlns:p14="http://schemas.microsoft.com/office/powerpoint/2010/main" val="2864500207"/>
       </p:ext>
     </p:extLst>
   </p:cSld>
@@ -5080,76 +5712,710 @@
       </p:grpSpPr>
       <p:sp>
         <p:nvSpPr>
-          <p:cNvPr id="2" name="Title 1"/>
-          <p:cNvSpPr>
-            <a:spLocks noGrp="1"/>
-          </p:cNvSpPr>
-          <p:nvPr>
-            <p:ph type="title"/>
-          </p:nvPr>
-        </p:nvSpPr>
-        <p:spPr/>
-        <p:txBody>
-          <a:bodyPr/>
+          <p:cNvPr id="2" name="Rectangle 1">
+            <a:extLst>
+              <a:ext uri="{FF2B5EF4-FFF2-40B4-BE49-F238E27FC236}">
+                <a16:creationId xmlns:a16="http://schemas.microsoft.com/office/drawing/2014/main" id="{7C34356E-2C70-3D4C-A540-4792AC17D614}"/>
+              </a:ext>
+            </a:extLst>
+          </p:cNvPr>
+          <p:cNvSpPr>
+            <a:spLocks noChangeArrowheads="1"/>
+          </p:cNvSpPr>
+          <p:nvPr/>
+        </p:nvSpPr>
+        <p:spPr bwMode="auto">
+          <a:xfrm>
+            <a:off x="762000" y="590051"/>
+            <a:ext cx="7620000" cy="2108221"/>
+          </a:xfrm>
+          <a:prstGeom prst="rect">
+            <a:avLst/>
+          </a:prstGeom>
+          <a:solidFill>
+            <a:srgbClr val="E6E6E6"/>
+          </a:solidFill>
+          <a:ln>
+            <a:noFill/>
+          </a:ln>
+          <a:effectLst/>
+          <a:extLst>
+            <a:ext uri="{91240B29-F687-4F45-9708-019B960494DF}">
+              <a14:hiddenLine xmlns:a14="http://schemas.microsoft.com/office/drawing/2010/main" w="9525">
+                <a:solidFill>
+                  <a:schemeClr val="tx1"/>
+                </a:solidFill>
+                <a:miter lim="800000"/>
+                <a:headEnd/>
+                <a:tailEnd/>
+              </a14:hiddenLine>
+            </a:ext>
+            <a:ext uri="{AF507438-7753-43E0-B8FC-AC1667EBCBE1}">
+              <a14:hiddenEffects xmlns:a14="http://schemas.microsoft.com/office/drawing/2010/main">
+                <a:effectLst>
+                  <a:outerShdw dist="35921" dir="2700000" algn="ctr" rotWithShape="0">
+                    <a:schemeClr val="bg2"/>
+                  </a:outerShdw>
+                </a:effectLst>
+              </a14:hiddenEffects>
+            </a:ext>
+          </a:extLst>
+        </p:spPr>
+        <p:txBody>
+          <a:bodyPr vert="horz" wrap="square" lIns="0" tIns="0" rIns="0" bIns="152352" numCol="1" anchor="ctr" anchorCtr="0" compatLnSpc="1">
+            <a:prstTxWarp prst="textNoShape">
+              <a:avLst/>
+            </a:prstTxWarp>
+            <a:spAutoFit/>
+          </a:bodyPr>
           <a:lstStyle/>
           <a:p>
-            <a:r>
-              <a:rPr lang="en-US" dirty="0" err="1"/>
-              <a:t>Expand.grid</a:t>
-            </a:r>
-            <a:r>
-              <a:rPr lang="en-US" dirty="0"/>
+            <a:pPr marL="0" marR="0" lvl="0" indent="0" algn="l" defTabSz="914400" rtl="0" eaLnBrk="0" fontAlgn="base" latinLnBrk="0" hangingPunct="0">
+              <a:lnSpc>
+                <a:spcPct val="100000"/>
+              </a:lnSpc>
+              <a:spcBef>
+                <a:spcPct val="0"/>
+              </a:spcBef>
+              <a:spcAft>
+                <a:spcPct val="0"/>
+              </a:spcAft>
+              <a:buClrTx/>
+              <a:buSzTx/>
+              <a:buFontTx/>
+              <a:buNone/>
+              <a:tabLst/>
+            </a:pPr>
+            <a:r>
+              <a:rPr kumimoji="0" lang="en-US" altLang="en-US" sz="3300" b="1" i="0" u="none" strike="noStrike" cap="none" normalizeH="0" baseline="0" dirty="0">
+                <a:ln>
+                  <a:noFill/>
+                </a:ln>
+                <a:solidFill>
+                  <a:srgbClr val="515151"/>
+                </a:solidFill>
+                <a:effectLst/>
+                <a:latin typeface="inherit"/>
+              </a:rPr>
+              <a:t>Random Data in R: </a:t>
+            </a:r>
+            <a:r>
+              <a:rPr kumimoji="0" lang="en-US" altLang="en-US" sz="3300" b="1" i="0" u="none" strike="noStrike" cap="none" normalizeH="0" baseline="0" dirty="0" err="1">
+                <a:ln>
+                  <a:noFill/>
+                </a:ln>
+                <a:solidFill>
+                  <a:srgbClr val="515151"/>
+                </a:solidFill>
+                <a:effectLst/>
+                <a:latin typeface="inherit"/>
+              </a:rPr>
+              <a:t>rpois</a:t>
+            </a:r>
+            <a:endParaRPr kumimoji="0" lang="en-US" altLang="en-US" sz="3300" b="1" i="0" u="none" strike="noStrike" cap="none" normalizeH="0" baseline="0" dirty="0">
+              <a:ln>
+                <a:noFill/>
+              </a:ln>
+              <a:solidFill>
+                <a:srgbClr val="515151"/>
+              </a:solidFill>
+              <a:effectLst/>
+              <a:latin typeface="inherit"/>
+            </a:endParaRPr>
+          </a:p>
+          <a:p>
+            <a:pPr marL="0" marR="0" lvl="0" indent="0" algn="l" defTabSz="914400" rtl="0" eaLnBrk="0" fontAlgn="base" latinLnBrk="0" hangingPunct="0">
+              <a:lnSpc>
+                <a:spcPct val="100000"/>
+              </a:lnSpc>
+              <a:spcBef>
+                <a:spcPct val="0"/>
+              </a:spcBef>
+              <a:spcAft>
+                <a:spcPct val="0"/>
+              </a:spcAft>
+              <a:buClrTx/>
+              <a:buSzTx/>
+              <a:buFontTx/>
+              <a:buNone/>
+              <a:tabLst/>
+            </a:pPr>
+            <a:r>
+              <a:rPr kumimoji="0" lang="en-US" altLang="en-US" sz="1500" b="0" i="0" u="none" strike="noStrike" cap="none" normalizeH="0" baseline="0" dirty="0" err="1">
+                <a:ln>
+                  <a:noFill/>
+                </a:ln>
+                <a:solidFill>
+                  <a:srgbClr val="515151"/>
+                </a:solidFill>
+                <a:effectLst/>
+                <a:latin typeface="inherit"/>
+              </a:rPr>
+              <a:t>data.frame</a:t>
+            </a:r>
+            <a:r>
+              <a:rPr kumimoji="0" lang="en-US" altLang="en-US" sz="1500" b="0" i="0" u="none" strike="noStrike" cap="none" normalizeH="0" baseline="0" dirty="0">
+                <a:ln>
+                  <a:noFill/>
+                </a:ln>
+                <a:solidFill>
+                  <a:srgbClr val="515151"/>
+                </a:solidFill>
+                <a:effectLst/>
+                <a:latin typeface="inherit"/>
+              </a:rPr>
+              <a:t>(</a:t>
+            </a:r>
+            <a:r>
+              <a:rPr kumimoji="0" lang="en-US" altLang="en-US" sz="1500" b="0" i="0" u="none" strike="noStrike" cap="none" normalizeH="0" baseline="0" dirty="0" err="1">
+                <a:ln>
+                  <a:noFill/>
+                </a:ln>
+                <a:solidFill>
+                  <a:srgbClr val="515151"/>
+                </a:solidFill>
+                <a:effectLst/>
+                <a:latin typeface="inherit"/>
+              </a:rPr>
+              <a:t>r_sample</a:t>
+            </a:r>
+            <a:r>
+              <a:rPr kumimoji="0" lang="en-US" altLang="en-US" sz="1500" b="0" i="0" u="none" strike="noStrike" cap="none" normalizeH="0" baseline="0" dirty="0">
+                <a:ln>
+                  <a:noFill/>
+                </a:ln>
+                <a:solidFill>
+                  <a:srgbClr val="515151"/>
+                </a:solidFill>
+                <a:effectLst/>
+                <a:latin typeface="inherit"/>
+              </a:rPr>
+              <a:t> = </a:t>
+            </a:r>
+            <a:r>
+              <a:rPr kumimoji="0" lang="en-US" altLang="en-US" sz="1500" b="0" i="0" u="none" strike="noStrike" cap="none" normalizeH="0" baseline="0" dirty="0" err="1">
+                <a:ln>
+                  <a:noFill/>
+                </a:ln>
+                <a:solidFill>
+                  <a:srgbClr val="515151"/>
+                </a:solidFill>
+                <a:effectLst/>
+                <a:latin typeface="inherit"/>
+              </a:rPr>
+              <a:t>rpois</a:t>
+            </a:r>
+            <a:r>
+              <a:rPr kumimoji="0" lang="en-US" altLang="en-US" sz="1500" b="0" i="0" u="none" strike="noStrike" cap="none" normalizeH="0" baseline="0" dirty="0">
+                <a:ln>
+                  <a:noFill/>
+                </a:ln>
+                <a:solidFill>
+                  <a:srgbClr val="515151"/>
+                </a:solidFill>
+                <a:effectLst/>
+                <a:latin typeface="inherit"/>
+              </a:rPr>
+              <a:t>(n = </a:t>
+            </a:r>
+            <a:r>
+              <a:rPr kumimoji="0" lang="en-US" altLang="en-US" sz="1500" b="0" i="0" u="none" strike="noStrike" cap="none" normalizeH="0" baseline="0" dirty="0">
+                <a:ln>
+                  <a:noFill/>
+                </a:ln>
+                <a:solidFill>
+                  <a:srgbClr val="7F0000"/>
+                </a:solidFill>
+                <a:effectLst/>
+                <a:latin typeface="inherit"/>
+              </a:rPr>
+              <a:t>10000</a:t>
+            </a:r>
+            <a:r>
+              <a:rPr kumimoji="0" lang="en-US" altLang="en-US" sz="1500" b="0" i="0" u="none" strike="noStrike" cap="none" normalizeH="0" baseline="0" dirty="0">
+                <a:ln>
+                  <a:noFill/>
+                </a:ln>
+                <a:solidFill>
+                  <a:srgbClr val="515151"/>
+                </a:solidFill>
+                <a:effectLst/>
+                <a:latin typeface="inherit"/>
+              </a:rPr>
+              <a:t>, lambda = </a:t>
+            </a:r>
+            <a:r>
+              <a:rPr kumimoji="0" lang="en-US" altLang="en-US" sz="1500" b="0" i="0" u="none" strike="noStrike" cap="none" normalizeH="0" baseline="0" dirty="0">
+                <a:ln>
+                  <a:noFill/>
+                </a:ln>
+                <a:solidFill>
+                  <a:srgbClr val="7F0000"/>
+                </a:solidFill>
+                <a:effectLst/>
+                <a:latin typeface="inherit"/>
+              </a:rPr>
+              <a:t>3</a:t>
+            </a:r>
+            <a:r>
+              <a:rPr kumimoji="0" lang="en-US" altLang="en-US" sz="1500" b="0" i="0" u="none" strike="noStrike" cap="none" normalizeH="0" baseline="0" dirty="0">
+                <a:ln>
+                  <a:noFill/>
+                </a:ln>
+                <a:solidFill>
+                  <a:srgbClr val="515151"/>
+                </a:solidFill>
+                <a:effectLst/>
+                <a:latin typeface="inherit"/>
+              </a:rPr>
+              <a:t>)) %&gt;% </a:t>
+            </a:r>
+          </a:p>
+          <a:p>
+            <a:pPr marL="0" marR="0" lvl="0" indent="0" algn="l" defTabSz="914400" rtl="0" eaLnBrk="0" fontAlgn="base" latinLnBrk="0" hangingPunct="0">
+              <a:lnSpc>
+                <a:spcPct val="100000"/>
+              </a:lnSpc>
+              <a:spcBef>
+                <a:spcPct val="0"/>
+              </a:spcBef>
+              <a:spcAft>
+                <a:spcPct val="0"/>
+              </a:spcAft>
+              <a:buClrTx/>
+              <a:buSzTx/>
+              <a:buFontTx/>
+              <a:buNone/>
+              <a:tabLst/>
+            </a:pPr>
+            <a:r>
+              <a:rPr lang="en-US" altLang="en-US" sz="1500" dirty="0">
+                <a:solidFill>
+                  <a:srgbClr val="515151"/>
+                </a:solidFill>
+                <a:latin typeface="inherit"/>
+              </a:rPr>
+              <a:t>	</a:t>
+            </a:r>
+            <a:r>
+              <a:rPr kumimoji="0" lang="en-US" altLang="en-US" sz="1500" b="0" i="0" u="none" strike="noStrike" cap="none" normalizeH="0" baseline="0" dirty="0" err="1">
+                <a:ln>
+                  <a:noFill/>
+                </a:ln>
+                <a:solidFill>
+                  <a:srgbClr val="515151"/>
+                </a:solidFill>
+                <a:effectLst/>
+                <a:latin typeface="inherit"/>
+              </a:rPr>
+              <a:t>ggplot</a:t>
+            </a:r>
+            <a:r>
+              <a:rPr kumimoji="0" lang="en-US" altLang="en-US" sz="1500" b="0" i="0" u="none" strike="noStrike" cap="none" normalizeH="0" baseline="0" dirty="0">
+                <a:ln>
+                  <a:noFill/>
+                </a:ln>
+                <a:solidFill>
+                  <a:srgbClr val="515151"/>
+                </a:solidFill>
+                <a:effectLst/>
+                <a:latin typeface="inherit"/>
+              </a:rPr>
+              <a:t>(</a:t>
+            </a:r>
+            <a:r>
+              <a:rPr kumimoji="0" lang="en-US" altLang="en-US" sz="1500" b="0" i="0" u="none" strike="noStrike" cap="none" normalizeH="0" baseline="0" dirty="0" err="1">
+                <a:ln>
+                  <a:noFill/>
+                </a:ln>
+                <a:solidFill>
+                  <a:srgbClr val="515151"/>
+                </a:solidFill>
+                <a:effectLst/>
+                <a:latin typeface="inherit"/>
+              </a:rPr>
+              <a:t>aes</a:t>
+            </a:r>
+            <a:r>
+              <a:rPr kumimoji="0" lang="en-US" altLang="en-US" sz="1500" b="0" i="0" u="none" strike="noStrike" cap="none" normalizeH="0" baseline="0" dirty="0">
+                <a:ln>
+                  <a:noFill/>
+                </a:ln>
+                <a:solidFill>
+                  <a:srgbClr val="515151"/>
+                </a:solidFill>
+                <a:effectLst/>
+                <a:latin typeface="inherit"/>
+              </a:rPr>
+              <a:t>(x = </a:t>
+            </a:r>
+            <a:r>
+              <a:rPr kumimoji="0" lang="en-US" altLang="en-US" sz="1500" b="0" i="0" u="none" strike="noStrike" cap="none" normalizeH="0" baseline="0" dirty="0" err="1">
+                <a:ln>
+                  <a:noFill/>
+                </a:ln>
+                <a:solidFill>
+                  <a:srgbClr val="515151"/>
+                </a:solidFill>
+                <a:effectLst/>
+                <a:latin typeface="inherit"/>
+              </a:rPr>
+              <a:t>r_sample</a:t>
+            </a:r>
+            <a:r>
+              <a:rPr kumimoji="0" lang="en-US" altLang="en-US" sz="1500" b="0" i="0" u="none" strike="noStrike" cap="none" normalizeH="0" baseline="0" dirty="0">
+                <a:ln>
+                  <a:noFill/>
+                </a:ln>
+                <a:solidFill>
+                  <a:srgbClr val="515151"/>
+                </a:solidFill>
+                <a:effectLst/>
+                <a:latin typeface="inherit"/>
+              </a:rPr>
+              <a:t>)) +</a:t>
+            </a:r>
+          </a:p>
+          <a:p>
+            <a:pPr marL="0" marR="0" lvl="0" indent="0" algn="l" defTabSz="914400" rtl="0" eaLnBrk="0" fontAlgn="base" latinLnBrk="0" hangingPunct="0">
+              <a:lnSpc>
+                <a:spcPct val="100000"/>
+              </a:lnSpc>
+              <a:spcBef>
+                <a:spcPct val="0"/>
+              </a:spcBef>
+              <a:spcAft>
+                <a:spcPct val="0"/>
+              </a:spcAft>
+              <a:buClrTx/>
+              <a:buSzTx/>
+              <a:buFontTx/>
+              <a:buNone/>
+              <a:tabLst/>
+            </a:pPr>
+            <a:r>
+              <a:rPr lang="en-US" altLang="en-US" sz="1500" dirty="0">
+                <a:solidFill>
+                  <a:srgbClr val="515151"/>
+                </a:solidFill>
+                <a:latin typeface="inherit"/>
+              </a:rPr>
+              <a:t>		</a:t>
+            </a:r>
+            <a:r>
+              <a:rPr kumimoji="0" lang="en-US" altLang="en-US" sz="1500" b="0" i="0" u="none" strike="noStrike" cap="none" normalizeH="0" baseline="0" dirty="0" err="1">
+                <a:ln>
+                  <a:noFill/>
+                </a:ln>
+                <a:solidFill>
+                  <a:srgbClr val="515151"/>
+                </a:solidFill>
+                <a:effectLst/>
+                <a:latin typeface="inherit"/>
+              </a:rPr>
+              <a:t>geom_histogram</a:t>
+            </a:r>
+            <a:r>
+              <a:rPr kumimoji="0" lang="en-US" altLang="en-US" sz="1500" b="0" i="0" u="none" strike="noStrike" cap="none" normalizeH="0" baseline="0" dirty="0">
+                <a:ln>
+                  <a:noFill/>
+                </a:ln>
+                <a:solidFill>
+                  <a:srgbClr val="515151"/>
+                </a:solidFill>
+                <a:effectLst/>
+                <a:latin typeface="inherit"/>
+              </a:rPr>
+              <a:t>() + </a:t>
+            </a:r>
+          </a:p>
+          <a:p>
+            <a:pPr marL="0" marR="0" lvl="0" indent="0" algn="l" defTabSz="914400" rtl="0" eaLnBrk="0" fontAlgn="base" latinLnBrk="0" hangingPunct="0">
+              <a:lnSpc>
+                <a:spcPct val="100000"/>
+              </a:lnSpc>
+              <a:spcBef>
+                <a:spcPct val="0"/>
+              </a:spcBef>
+              <a:spcAft>
+                <a:spcPct val="0"/>
+              </a:spcAft>
+              <a:buClrTx/>
+              <a:buSzTx/>
+              <a:buFontTx/>
+              <a:buNone/>
+              <a:tabLst/>
+            </a:pPr>
+            <a:r>
+              <a:rPr lang="en-US" altLang="en-US" sz="1500" dirty="0">
+                <a:solidFill>
+                  <a:srgbClr val="515151"/>
+                </a:solidFill>
+                <a:latin typeface="inherit"/>
+              </a:rPr>
+              <a:t>		</a:t>
+            </a:r>
+            <a:r>
+              <a:rPr kumimoji="0" lang="en-US" altLang="en-US" sz="1500" b="0" i="0" u="none" strike="noStrike" cap="none" normalizeH="0" baseline="0" dirty="0" err="1">
+                <a:ln>
+                  <a:noFill/>
+                </a:ln>
+                <a:solidFill>
+                  <a:srgbClr val="515151"/>
+                </a:solidFill>
+                <a:effectLst/>
+                <a:latin typeface="inherit"/>
+              </a:rPr>
+              <a:t>geom_vline</a:t>
+            </a:r>
+            <a:r>
+              <a:rPr kumimoji="0" lang="en-US" altLang="en-US" sz="1500" b="0" i="0" u="none" strike="noStrike" cap="none" normalizeH="0" baseline="0" dirty="0">
+                <a:ln>
+                  <a:noFill/>
+                </a:ln>
+                <a:solidFill>
+                  <a:srgbClr val="515151"/>
+                </a:solidFill>
+                <a:effectLst/>
+                <a:latin typeface="inherit"/>
+              </a:rPr>
+              <a:t>(</a:t>
+            </a:r>
+            <a:r>
+              <a:rPr kumimoji="0" lang="en-US" altLang="en-US" sz="1500" b="0" i="0" u="none" strike="noStrike" cap="none" normalizeH="0" baseline="0" dirty="0" err="1">
+                <a:ln>
+                  <a:noFill/>
+                </a:ln>
+                <a:solidFill>
+                  <a:srgbClr val="515151"/>
+                </a:solidFill>
+                <a:effectLst/>
+                <a:latin typeface="inherit"/>
+              </a:rPr>
+              <a:t>xintercept</a:t>
+            </a:r>
+            <a:r>
+              <a:rPr kumimoji="0" lang="en-US" altLang="en-US" sz="1500" b="0" i="0" u="none" strike="noStrike" cap="none" normalizeH="0" baseline="0" dirty="0">
+                <a:ln>
+                  <a:noFill/>
+                </a:ln>
+                <a:solidFill>
+                  <a:srgbClr val="515151"/>
+                </a:solidFill>
+                <a:effectLst/>
+                <a:latin typeface="inherit"/>
+              </a:rPr>
+              <a:t> = </a:t>
+            </a:r>
+            <a:r>
+              <a:rPr kumimoji="0" lang="en-US" altLang="en-US" sz="1500" b="0" i="0" u="none" strike="noStrike" cap="none" normalizeH="0" baseline="0" dirty="0">
+                <a:ln>
+                  <a:noFill/>
+                </a:ln>
+                <a:solidFill>
+                  <a:srgbClr val="7F0000"/>
+                </a:solidFill>
+                <a:effectLst/>
+                <a:latin typeface="inherit"/>
+              </a:rPr>
+              <a:t>3</a:t>
+            </a:r>
+            <a:r>
+              <a:rPr kumimoji="0" lang="en-US" altLang="en-US" sz="1500" b="0" i="0" u="none" strike="noStrike" cap="none" normalizeH="0" baseline="0" dirty="0">
+                <a:ln>
+                  <a:noFill/>
+                </a:ln>
+                <a:solidFill>
+                  <a:srgbClr val="515151"/>
+                </a:solidFill>
+                <a:effectLst/>
+                <a:latin typeface="inherit"/>
+              </a:rPr>
+              <a:t>, color = </a:t>
+            </a:r>
+            <a:r>
+              <a:rPr kumimoji="0" lang="en-US" altLang="en-US" sz="1500" b="0" i="0" u="none" strike="noStrike" cap="none" normalizeH="0" baseline="0" dirty="0">
+                <a:ln>
+                  <a:noFill/>
+                </a:ln>
+                <a:solidFill>
+                  <a:srgbClr val="009F5D"/>
+                </a:solidFill>
+                <a:effectLst/>
+                <a:latin typeface="inherit"/>
+              </a:rPr>
+              <a:t>'red'</a:t>
+            </a:r>
+            <a:r>
+              <a:rPr kumimoji="0" lang="en-US" altLang="en-US" sz="1500" b="0" i="0" u="none" strike="noStrike" cap="none" normalizeH="0" baseline="0" dirty="0">
+                <a:ln>
+                  <a:noFill/>
+                </a:ln>
+                <a:solidFill>
+                  <a:srgbClr val="515151"/>
+                </a:solidFill>
+                <a:effectLst/>
+                <a:latin typeface="inherit"/>
+              </a:rPr>
+              <a:t>) + </a:t>
+            </a:r>
+          </a:p>
+          <a:p>
+            <a:pPr marL="0" marR="0" lvl="0" indent="0" algn="l" defTabSz="914400" rtl="0" eaLnBrk="0" fontAlgn="base" latinLnBrk="0" hangingPunct="0">
+              <a:lnSpc>
+                <a:spcPct val="100000"/>
+              </a:lnSpc>
+              <a:spcBef>
+                <a:spcPct val="0"/>
+              </a:spcBef>
+              <a:spcAft>
+                <a:spcPct val="0"/>
+              </a:spcAft>
+              <a:buClrTx/>
+              <a:buSzTx/>
+              <a:buFontTx/>
+              <a:buNone/>
+              <a:tabLst/>
+            </a:pPr>
+            <a:r>
+              <a:rPr lang="en-US" altLang="en-US" sz="1500" dirty="0">
+                <a:solidFill>
+                  <a:srgbClr val="515151"/>
+                </a:solidFill>
+                <a:latin typeface="inherit"/>
+              </a:rPr>
+              <a:t>		</a:t>
+            </a:r>
+            <a:r>
+              <a:rPr kumimoji="0" lang="en-US" altLang="en-US" sz="1500" b="0" i="0" u="none" strike="noStrike" cap="none" normalizeH="0" baseline="0" dirty="0" err="1">
+                <a:ln>
+                  <a:noFill/>
+                </a:ln>
+                <a:solidFill>
+                  <a:srgbClr val="515151"/>
+                </a:solidFill>
+                <a:effectLst/>
+                <a:latin typeface="inherit"/>
+              </a:rPr>
+              <a:t>theme_linedraw</a:t>
+            </a:r>
+            <a:r>
+              <a:rPr kumimoji="0" lang="en-US" altLang="en-US" sz="1500" b="0" i="0" u="none" strike="noStrike" cap="none" normalizeH="0" baseline="0" dirty="0">
+                <a:ln>
+                  <a:noFill/>
+                </a:ln>
+                <a:solidFill>
+                  <a:srgbClr val="515151"/>
+                </a:solidFill>
+                <a:effectLst/>
+                <a:latin typeface="inherit"/>
+              </a:rPr>
               <a:t>()</a:t>
             </a:r>
-          </a:p>
-        </p:txBody>
-      </p:sp>
-      <p:sp>
-        <p:nvSpPr>
-          <p:cNvPr id="3" name="Content Placeholder 2"/>
-          <p:cNvSpPr>
-            <a:spLocks noGrp="1"/>
-          </p:cNvSpPr>
-          <p:nvPr>
-            <p:ph idx="1"/>
-          </p:nvPr>
-        </p:nvSpPr>
-        <p:spPr/>
-        <p:txBody>
-          <a:bodyPr/>
-          <a:lstStyle/>
-          <a:p>
-            <a:r>
-              <a:rPr lang="en-US" dirty="0" err="1"/>
-              <a:t>Expand.grid</a:t>
-            </a:r>
-            <a:r>
-              <a:rPr lang="en-US" dirty="0"/>
-              <a:t>((gender=c("M","F"), education=c("</a:t>
-            </a:r>
-            <a:r>
-              <a:rPr lang="en-US" dirty="0" err="1"/>
-              <a:t>HS","College","Advanced</a:t>
-            </a:r>
-            <a:r>
-              <a:rPr lang="en-US" dirty="0"/>
-              <a:t>"),status=c("</a:t>
-            </a:r>
-            <a:r>
-              <a:rPr lang="en-US" dirty="0" err="1"/>
-              <a:t>Single","Married","Divorced","Widowed</a:t>
-            </a:r>
-            <a:r>
-              <a:rPr lang="en-US" dirty="0"/>
-              <a:t>"))</a:t>
-            </a:r>
-          </a:p>
-        </p:txBody>
-      </p:sp>
+            <a:endParaRPr kumimoji="0" lang="en-US" altLang="en-US" sz="800" b="0" i="0" u="none" strike="noStrike" cap="none" normalizeH="0" baseline="0" dirty="0">
+              <a:ln>
+                <a:noFill/>
+              </a:ln>
+              <a:solidFill>
+                <a:schemeClr val="tx1"/>
+              </a:solidFill>
+              <a:effectLst/>
+            </a:endParaRPr>
+          </a:p>
+          <a:p>
+            <a:pPr marL="0" marR="0" lvl="0" indent="0" algn="l" defTabSz="914400" rtl="0" eaLnBrk="0" fontAlgn="base" latinLnBrk="0" hangingPunct="0">
+              <a:lnSpc>
+                <a:spcPct val="100000"/>
+              </a:lnSpc>
+              <a:spcBef>
+                <a:spcPct val="0"/>
+              </a:spcBef>
+              <a:spcAft>
+                <a:spcPct val="0"/>
+              </a:spcAft>
+              <a:buClrTx/>
+              <a:buSzTx/>
+              <a:buFontTx/>
+              <a:buNone/>
+              <a:tabLst/>
+            </a:pPr>
+            <a:r>
+              <a:rPr kumimoji="0" lang="en-US" altLang="en-US" sz="1900" b="0" i="0" u="none" strike="noStrike" cap="none" normalizeH="0" baseline="0" dirty="0">
+                <a:ln>
+                  <a:noFill/>
+                </a:ln>
+                <a:solidFill>
+                  <a:schemeClr val="tx1"/>
+                </a:solidFill>
+                <a:effectLst/>
+                <a:latin typeface="inherit"/>
+              </a:rPr>
+              <a:t>  </a:t>
+            </a:r>
+            <a:endParaRPr kumimoji="0" lang="en-US" altLang="en-US" sz="23600" b="0" i="0" u="none" strike="noStrike" cap="none" normalizeH="0" baseline="0" dirty="0">
+              <a:ln>
+                <a:noFill/>
+              </a:ln>
+              <a:solidFill>
+                <a:schemeClr val="tx1"/>
+              </a:solidFill>
+              <a:effectLst/>
+              <a:latin typeface="inherit"/>
+            </a:endParaRPr>
+          </a:p>
+        </p:txBody>
+      </p:sp>
+      <p:pic>
+        <p:nvPicPr>
+          <p:cNvPr id="2050" name="Picture 2">
+            <a:extLst>
+              <a:ext uri="{FF2B5EF4-FFF2-40B4-BE49-F238E27FC236}">
+                <a16:creationId xmlns:a16="http://schemas.microsoft.com/office/drawing/2014/main" id="{7862549C-4A8A-F246-B8BB-C42D8116E03E}"/>
+              </a:ext>
+            </a:extLst>
+          </p:cNvPr>
+          <p:cNvPicPr>
+            <a:picLocks noChangeAspect="1" noChangeArrowheads="1"/>
+          </p:cNvPicPr>
+          <p:nvPr/>
+        </p:nvPicPr>
+        <p:blipFill>
+          <a:blip r:embed="rId2">
+            <a:extLst>
+              <a:ext uri="{28A0092B-C50C-407E-A947-70E740481C1C}">
+                <a14:useLocalDpi xmlns:a14="http://schemas.microsoft.com/office/drawing/2010/main" val="0"/>
+              </a:ext>
+            </a:extLst>
+          </a:blip>
+          <a:srcRect/>
+          <a:stretch>
+            <a:fillRect/>
+          </a:stretch>
+        </p:blipFill>
+        <p:spPr bwMode="auto">
+          <a:xfrm>
+            <a:off x="1524000" y="2895112"/>
+            <a:ext cx="6096000" cy="3759200"/>
+          </a:xfrm>
+          <a:prstGeom prst="rect">
+            <a:avLst/>
+          </a:prstGeom>
+          <a:noFill/>
+          <a:extLst>
+            <a:ext uri="{909E8E84-426E-40DD-AFC4-6F175D3DCCD1}">
+              <a14:hiddenFill xmlns:a14="http://schemas.microsoft.com/office/drawing/2010/main">
+                <a:solidFill>
+                  <a:srgbClr val="FFFFFF"/>
+                </a:solidFill>
+              </a14:hiddenFill>
+            </a:ext>
+          </a:extLst>
+        </p:spPr>
+      </p:pic>
     </p:spTree>
     <p:extLst>
       <p:ext uri="{BB962C8B-B14F-4D97-AF65-F5344CB8AC3E}">
-        <p14:creationId xmlns:p14="http://schemas.microsoft.com/office/powerpoint/2010/main" val="2183772153"/>
+        <p14:creationId xmlns:p14="http://schemas.microsoft.com/office/powerpoint/2010/main" val="944867703"/>
       </p:ext>
     </p:extLst>
   </p:cSld>
@@ -5178,6 +6444,659 @@
       </p:grpSpPr>
       <p:sp>
         <p:nvSpPr>
+          <p:cNvPr id="2" name="Rectangle 1">
+            <a:extLst>
+              <a:ext uri="{FF2B5EF4-FFF2-40B4-BE49-F238E27FC236}">
+                <a16:creationId xmlns:a16="http://schemas.microsoft.com/office/drawing/2014/main" id="{4B6867D8-C7EC-9E4B-9E78-6E8D7963D641}"/>
+              </a:ext>
+            </a:extLst>
+          </p:cNvPr>
+          <p:cNvSpPr>
+            <a:spLocks noChangeArrowheads="1"/>
+          </p:cNvSpPr>
+          <p:nvPr/>
+        </p:nvSpPr>
+        <p:spPr bwMode="auto">
+          <a:xfrm>
+            <a:off x="509954" y="916481"/>
+            <a:ext cx="6981092" cy="1877389"/>
+          </a:xfrm>
+          <a:prstGeom prst="rect">
+            <a:avLst/>
+          </a:prstGeom>
+          <a:solidFill>
+            <a:srgbClr val="E6E6E6"/>
+          </a:solidFill>
+          <a:ln>
+            <a:noFill/>
+          </a:ln>
+          <a:effectLst/>
+          <a:extLst>
+            <a:ext uri="{91240B29-F687-4F45-9708-019B960494DF}">
+              <a14:hiddenLine xmlns:a14="http://schemas.microsoft.com/office/drawing/2010/main" w="9525">
+                <a:solidFill>
+                  <a:schemeClr val="tx1"/>
+                </a:solidFill>
+                <a:miter lim="800000"/>
+                <a:headEnd/>
+                <a:tailEnd/>
+              </a14:hiddenLine>
+            </a:ext>
+            <a:ext uri="{AF507438-7753-43E0-B8FC-AC1667EBCBE1}">
+              <a14:hiddenEffects xmlns:a14="http://schemas.microsoft.com/office/drawing/2010/main">
+                <a:effectLst>
+                  <a:outerShdw dist="35921" dir="2700000" algn="ctr" rotWithShape="0">
+                    <a:schemeClr val="bg2"/>
+                  </a:outerShdw>
+                </a:effectLst>
+              </a14:hiddenEffects>
+            </a:ext>
+          </a:extLst>
+        </p:spPr>
+        <p:txBody>
+          <a:bodyPr vert="horz" wrap="square" lIns="0" tIns="0" rIns="0" bIns="152352" numCol="1" anchor="ctr" anchorCtr="0" compatLnSpc="1">
+            <a:prstTxWarp prst="textNoShape">
+              <a:avLst/>
+            </a:prstTxWarp>
+            <a:spAutoFit/>
+          </a:bodyPr>
+          <a:lstStyle/>
+          <a:p>
+            <a:pPr marL="0" marR="0" lvl="0" indent="0" algn="l" defTabSz="914400" rtl="0" eaLnBrk="0" fontAlgn="base" latinLnBrk="0" hangingPunct="0">
+              <a:lnSpc>
+                <a:spcPct val="100000"/>
+              </a:lnSpc>
+              <a:spcBef>
+                <a:spcPct val="0"/>
+              </a:spcBef>
+              <a:spcAft>
+                <a:spcPct val="0"/>
+              </a:spcAft>
+              <a:buClrTx/>
+              <a:buSzTx/>
+              <a:buFontTx/>
+              <a:buNone/>
+              <a:tabLst/>
+            </a:pPr>
+            <a:r>
+              <a:rPr kumimoji="0" lang="en-US" altLang="en-US" sz="3300" b="1" i="0" u="none" strike="noStrike" cap="none" normalizeH="0" baseline="0" dirty="0">
+                <a:ln>
+                  <a:noFill/>
+                </a:ln>
+                <a:solidFill>
+                  <a:srgbClr val="515151"/>
+                </a:solidFill>
+                <a:effectLst/>
+                <a:latin typeface="inherit"/>
+              </a:rPr>
+              <a:t>Random Data in R: </a:t>
+            </a:r>
+            <a:r>
+              <a:rPr kumimoji="0" lang="en-US" altLang="en-US" sz="3300" b="1" i="0" u="none" strike="noStrike" cap="none" normalizeH="0" baseline="0" dirty="0" err="1">
+                <a:ln>
+                  <a:noFill/>
+                </a:ln>
+                <a:solidFill>
+                  <a:srgbClr val="515151"/>
+                </a:solidFill>
+                <a:effectLst/>
+                <a:latin typeface="inherit"/>
+              </a:rPr>
+              <a:t>rbinom</a:t>
+            </a:r>
+            <a:endParaRPr kumimoji="0" lang="en-US" altLang="en-US" sz="3300" b="1" i="0" u="none" strike="noStrike" cap="none" normalizeH="0" baseline="0" dirty="0">
+              <a:ln>
+                <a:noFill/>
+              </a:ln>
+              <a:solidFill>
+                <a:srgbClr val="515151"/>
+              </a:solidFill>
+              <a:effectLst/>
+              <a:latin typeface="inherit"/>
+            </a:endParaRPr>
+          </a:p>
+          <a:p>
+            <a:pPr marL="0" marR="0" lvl="0" indent="0" algn="l" defTabSz="914400" rtl="0" eaLnBrk="0" fontAlgn="base" latinLnBrk="0" hangingPunct="0">
+              <a:lnSpc>
+                <a:spcPct val="100000"/>
+              </a:lnSpc>
+              <a:spcBef>
+                <a:spcPct val="0"/>
+              </a:spcBef>
+              <a:spcAft>
+                <a:spcPct val="0"/>
+              </a:spcAft>
+              <a:buClrTx/>
+              <a:buSzTx/>
+              <a:buFontTx/>
+              <a:buNone/>
+              <a:tabLst/>
+            </a:pPr>
+            <a:r>
+              <a:rPr kumimoji="0" lang="en-US" altLang="en-US" sz="1500" b="0" i="0" u="none" strike="noStrike" cap="none" normalizeH="0" baseline="0" dirty="0" err="1">
+                <a:ln>
+                  <a:noFill/>
+                </a:ln>
+                <a:solidFill>
+                  <a:srgbClr val="515151"/>
+                </a:solidFill>
+                <a:effectLst/>
+                <a:latin typeface="inherit"/>
+              </a:rPr>
+              <a:t>data.frame</a:t>
+            </a:r>
+            <a:r>
+              <a:rPr kumimoji="0" lang="en-US" altLang="en-US" sz="1500" b="0" i="0" u="none" strike="noStrike" cap="none" normalizeH="0" baseline="0" dirty="0">
+                <a:ln>
+                  <a:noFill/>
+                </a:ln>
+                <a:solidFill>
+                  <a:srgbClr val="515151"/>
+                </a:solidFill>
+                <a:effectLst/>
+                <a:latin typeface="inherit"/>
+              </a:rPr>
+              <a:t>(</a:t>
+            </a:r>
+            <a:r>
+              <a:rPr kumimoji="0" lang="en-US" altLang="en-US" sz="1500" b="0" i="0" u="none" strike="noStrike" cap="none" normalizeH="0" baseline="0" dirty="0" err="1">
+                <a:ln>
+                  <a:noFill/>
+                </a:ln>
+                <a:solidFill>
+                  <a:srgbClr val="515151"/>
+                </a:solidFill>
+                <a:effectLst/>
+                <a:latin typeface="inherit"/>
+              </a:rPr>
+              <a:t>r_sample</a:t>
+            </a:r>
+            <a:r>
+              <a:rPr kumimoji="0" lang="en-US" altLang="en-US" sz="1500" b="0" i="0" u="none" strike="noStrike" cap="none" normalizeH="0" baseline="0" dirty="0">
+                <a:ln>
+                  <a:noFill/>
+                </a:ln>
+                <a:solidFill>
+                  <a:srgbClr val="515151"/>
+                </a:solidFill>
+                <a:effectLst/>
+                <a:latin typeface="inherit"/>
+              </a:rPr>
+              <a:t> = </a:t>
+            </a:r>
+            <a:r>
+              <a:rPr kumimoji="0" lang="en-US" altLang="en-US" sz="1500" b="0" i="0" u="none" strike="noStrike" cap="none" normalizeH="0" baseline="0" dirty="0" err="1">
+                <a:ln>
+                  <a:noFill/>
+                </a:ln>
+                <a:solidFill>
+                  <a:srgbClr val="515151"/>
+                </a:solidFill>
+                <a:effectLst/>
+                <a:latin typeface="inherit"/>
+              </a:rPr>
+              <a:t>rbinom</a:t>
+            </a:r>
+            <a:r>
+              <a:rPr kumimoji="0" lang="en-US" altLang="en-US" sz="1500" b="0" i="0" u="none" strike="noStrike" cap="none" normalizeH="0" baseline="0" dirty="0">
+                <a:ln>
+                  <a:noFill/>
+                </a:ln>
+                <a:solidFill>
+                  <a:srgbClr val="515151"/>
+                </a:solidFill>
+                <a:effectLst/>
+                <a:latin typeface="inherit"/>
+              </a:rPr>
+              <a:t>(n = </a:t>
+            </a:r>
+            <a:r>
+              <a:rPr kumimoji="0" lang="en-US" altLang="en-US" sz="1500" b="0" i="0" u="none" strike="noStrike" cap="none" normalizeH="0" baseline="0" dirty="0">
+                <a:ln>
+                  <a:noFill/>
+                </a:ln>
+                <a:solidFill>
+                  <a:srgbClr val="7F0000"/>
+                </a:solidFill>
+                <a:effectLst/>
+                <a:latin typeface="inherit"/>
+              </a:rPr>
+              <a:t>10000</a:t>
+            </a:r>
+            <a:r>
+              <a:rPr kumimoji="0" lang="en-US" altLang="en-US" sz="1500" b="0" i="0" u="none" strike="noStrike" cap="none" normalizeH="0" baseline="0" dirty="0">
+                <a:ln>
+                  <a:noFill/>
+                </a:ln>
+                <a:solidFill>
+                  <a:srgbClr val="515151"/>
+                </a:solidFill>
+                <a:effectLst/>
+                <a:latin typeface="inherit"/>
+              </a:rPr>
+              <a:t>, size = </a:t>
+            </a:r>
+            <a:r>
+              <a:rPr kumimoji="0" lang="en-US" altLang="en-US" sz="1500" b="0" i="0" u="none" strike="noStrike" cap="none" normalizeH="0" baseline="0" dirty="0">
+                <a:ln>
+                  <a:noFill/>
+                </a:ln>
+                <a:solidFill>
+                  <a:srgbClr val="7F0000"/>
+                </a:solidFill>
+                <a:effectLst/>
+                <a:latin typeface="inherit"/>
+              </a:rPr>
+              <a:t>1</a:t>
+            </a:r>
+            <a:r>
+              <a:rPr kumimoji="0" lang="en-US" altLang="en-US" sz="1500" b="0" i="0" u="none" strike="noStrike" cap="none" normalizeH="0" baseline="0" dirty="0">
+                <a:ln>
+                  <a:noFill/>
+                </a:ln>
+                <a:solidFill>
+                  <a:srgbClr val="515151"/>
+                </a:solidFill>
+                <a:effectLst/>
+                <a:latin typeface="inherit"/>
+              </a:rPr>
+              <a:t>, </a:t>
+            </a:r>
+            <a:r>
+              <a:rPr kumimoji="0" lang="en-US" altLang="en-US" sz="1500" b="0" i="0" u="none" strike="noStrike" cap="none" normalizeH="0" baseline="0" dirty="0" err="1">
+                <a:ln>
+                  <a:noFill/>
+                </a:ln>
+                <a:solidFill>
+                  <a:srgbClr val="515151"/>
+                </a:solidFill>
+                <a:effectLst/>
+                <a:latin typeface="inherit"/>
+              </a:rPr>
+              <a:t>prob</a:t>
+            </a:r>
+            <a:r>
+              <a:rPr kumimoji="0" lang="en-US" altLang="en-US" sz="1500" b="0" i="0" u="none" strike="noStrike" cap="none" normalizeH="0" baseline="0" dirty="0">
+                <a:ln>
+                  <a:noFill/>
+                </a:ln>
+                <a:solidFill>
+                  <a:srgbClr val="515151"/>
+                </a:solidFill>
+                <a:effectLst/>
+                <a:latin typeface="inherit"/>
+              </a:rPr>
+              <a:t> = </a:t>
+            </a:r>
+            <a:r>
+              <a:rPr kumimoji="0" lang="en-US" altLang="en-US" sz="1500" b="0" i="0" u="none" strike="noStrike" cap="none" normalizeH="0" baseline="0" dirty="0">
+                <a:ln>
+                  <a:noFill/>
+                </a:ln>
+                <a:solidFill>
+                  <a:srgbClr val="7F0000"/>
+                </a:solidFill>
+                <a:effectLst/>
+                <a:latin typeface="inherit"/>
+              </a:rPr>
+              <a:t>0.5</a:t>
+            </a:r>
+            <a:r>
+              <a:rPr kumimoji="0" lang="en-US" altLang="en-US" sz="1500" b="0" i="0" u="none" strike="noStrike" cap="none" normalizeH="0" baseline="0" dirty="0">
+                <a:ln>
+                  <a:noFill/>
+                </a:ln>
+                <a:solidFill>
+                  <a:srgbClr val="515151"/>
+                </a:solidFill>
+                <a:effectLst/>
+                <a:latin typeface="inherit"/>
+              </a:rPr>
+              <a:t>)) %&gt;% </a:t>
+            </a:r>
+          </a:p>
+          <a:p>
+            <a:pPr marL="0" marR="0" lvl="0" indent="0" algn="l" defTabSz="914400" rtl="0" eaLnBrk="0" fontAlgn="base" latinLnBrk="0" hangingPunct="0">
+              <a:lnSpc>
+                <a:spcPct val="100000"/>
+              </a:lnSpc>
+              <a:spcBef>
+                <a:spcPct val="0"/>
+              </a:spcBef>
+              <a:spcAft>
+                <a:spcPct val="0"/>
+              </a:spcAft>
+              <a:buClrTx/>
+              <a:buSzTx/>
+              <a:buFontTx/>
+              <a:buNone/>
+              <a:tabLst/>
+            </a:pPr>
+            <a:r>
+              <a:rPr lang="en-US" altLang="en-US" sz="1500" dirty="0">
+                <a:solidFill>
+                  <a:srgbClr val="515151"/>
+                </a:solidFill>
+                <a:latin typeface="inherit"/>
+              </a:rPr>
+              <a:t>	</a:t>
+            </a:r>
+            <a:r>
+              <a:rPr kumimoji="0" lang="en-US" altLang="en-US" sz="1500" b="0" i="0" u="none" strike="noStrike" cap="none" normalizeH="0" baseline="0" dirty="0" err="1">
+                <a:ln>
+                  <a:noFill/>
+                </a:ln>
+                <a:solidFill>
+                  <a:srgbClr val="515151"/>
+                </a:solidFill>
+                <a:effectLst/>
+                <a:latin typeface="inherit"/>
+              </a:rPr>
+              <a:t>ggplot</a:t>
+            </a:r>
+            <a:r>
+              <a:rPr kumimoji="0" lang="en-US" altLang="en-US" sz="1500" b="0" i="0" u="none" strike="noStrike" cap="none" normalizeH="0" baseline="0" dirty="0">
+                <a:ln>
+                  <a:noFill/>
+                </a:ln>
+                <a:solidFill>
+                  <a:srgbClr val="515151"/>
+                </a:solidFill>
+                <a:effectLst/>
+                <a:latin typeface="inherit"/>
+              </a:rPr>
+              <a:t>(</a:t>
+            </a:r>
+            <a:r>
+              <a:rPr kumimoji="0" lang="en-US" altLang="en-US" sz="1500" b="0" i="0" u="none" strike="noStrike" cap="none" normalizeH="0" baseline="0" dirty="0" err="1">
+                <a:ln>
+                  <a:noFill/>
+                </a:ln>
+                <a:solidFill>
+                  <a:srgbClr val="515151"/>
+                </a:solidFill>
+                <a:effectLst/>
+                <a:latin typeface="inherit"/>
+              </a:rPr>
+              <a:t>aes</a:t>
+            </a:r>
+            <a:r>
+              <a:rPr kumimoji="0" lang="en-US" altLang="en-US" sz="1500" b="0" i="0" u="none" strike="noStrike" cap="none" normalizeH="0" baseline="0" dirty="0">
+                <a:ln>
+                  <a:noFill/>
+                </a:ln>
+                <a:solidFill>
+                  <a:srgbClr val="515151"/>
+                </a:solidFill>
+                <a:effectLst/>
+                <a:latin typeface="inherit"/>
+              </a:rPr>
+              <a:t>(x = </a:t>
+            </a:r>
+            <a:r>
+              <a:rPr kumimoji="0" lang="en-US" altLang="en-US" sz="1500" b="0" i="0" u="none" strike="noStrike" cap="none" normalizeH="0" baseline="0" dirty="0" err="1">
+                <a:ln>
+                  <a:noFill/>
+                </a:ln>
+                <a:solidFill>
+                  <a:srgbClr val="515151"/>
+                </a:solidFill>
+                <a:effectLst/>
+                <a:latin typeface="inherit"/>
+              </a:rPr>
+              <a:t>r_sample</a:t>
+            </a:r>
+            <a:r>
+              <a:rPr kumimoji="0" lang="en-US" altLang="en-US" sz="1500" b="0" i="0" u="none" strike="noStrike" cap="none" normalizeH="0" baseline="0" dirty="0">
+                <a:ln>
+                  <a:noFill/>
+                </a:ln>
+                <a:solidFill>
+                  <a:srgbClr val="515151"/>
+                </a:solidFill>
+                <a:effectLst/>
+                <a:latin typeface="inherit"/>
+              </a:rPr>
+              <a:t>)) + </a:t>
+            </a:r>
+          </a:p>
+          <a:p>
+            <a:pPr marL="0" marR="0" lvl="0" indent="0" algn="l" defTabSz="914400" rtl="0" eaLnBrk="0" fontAlgn="base" latinLnBrk="0" hangingPunct="0">
+              <a:lnSpc>
+                <a:spcPct val="100000"/>
+              </a:lnSpc>
+              <a:spcBef>
+                <a:spcPct val="0"/>
+              </a:spcBef>
+              <a:spcAft>
+                <a:spcPct val="0"/>
+              </a:spcAft>
+              <a:buClrTx/>
+              <a:buSzTx/>
+              <a:buFontTx/>
+              <a:buNone/>
+              <a:tabLst/>
+            </a:pPr>
+            <a:r>
+              <a:rPr lang="en-US" altLang="en-US" sz="1500" dirty="0">
+                <a:solidFill>
+                  <a:srgbClr val="515151"/>
+                </a:solidFill>
+                <a:latin typeface="inherit"/>
+              </a:rPr>
+              <a:t>		</a:t>
+            </a:r>
+            <a:r>
+              <a:rPr kumimoji="0" lang="en-US" altLang="en-US" sz="1500" b="0" i="0" u="none" strike="noStrike" cap="none" normalizeH="0" baseline="0" dirty="0" err="1">
+                <a:ln>
+                  <a:noFill/>
+                </a:ln>
+                <a:solidFill>
+                  <a:srgbClr val="515151"/>
+                </a:solidFill>
+                <a:effectLst/>
+                <a:latin typeface="inherit"/>
+              </a:rPr>
+              <a:t>geom_histogram</a:t>
+            </a:r>
+            <a:r>
+              <a:rPr kumimoji="0" lang="en-US" altLang="en-US" sz="1500" b="0" i="0" u="none" strike="noStrike" cap="none" normalizeH="0" baseline="0" dirty="0">
+                <a:ln>
+                  <a:noFill/>
+                </a:ln>
+                <a:solidFill>
+                  <a:srgbClr val="515151"/>
+                </a:solidFill>
+                <a:effectLst/>
+                <a:latin typeface="inherit"/>
+              </a:rPr>
+              <a:t>() + </a:t>
+            </a:r>
+          </a:p>
+          <a:p>
+            <a:pPr marL="0" marR="0" lvl="0" indent="0" algn="l" defTabSz="914400" rtl="0" eaLnBrk="0" fontAlgn="base" latinLnBrk="0" hangingPunct="0">
+              <a:lnSpc>
+                <a:spcPct val="100000"/>
+              </a:lnSpc>
+              <a:spcBef>
+                <a:spcPct val="0"/>
+              </a:spcBef>
+              <a:spcAft>
+                <a:spcPct val="0"/>
+              </a:spcAft>
+              <a:buClrTx/>
+              <a:buSzTx/>
+              <a:buFontTx/>
+              <a:buNone/>
+              <a:tabLst/>
+            </a:pPr>
+            <a:r>
+              <a:rPr lang="en-US" altLang="en-US" sz="1500" dirty="0">
+                <a:solidFill>
+                  <a:srgbClr val="515151"/>
+                </a:solidFill>
+                <a:latin typeface="inherit"/>
+              </a:rPr>
+              <a:t>		</a:t>
+            </a:r>
+            <a:r>
+              <a:rPr kumimoji="0" lang="en-US" altLang="en-US" sz="1500" b="0" i="0" u="none" strike="noStrike" cap="none" normalizeH="0" baseline="0" dirty="0" err="1">
+                <a:ln>
+                  <a:noFill/>
+                </a:ln>
+                <a:solidFill>
+                  <a:srgbClr val="515151"/>
+                </a:solidFill>
+                <a:effectLst/>
+                <a:latin typeface="inherit"/>
+              </a:rPr>
+              <a:t>theme_linedraw</a:t>
+            </a:r>
+            <a:r>
+              <a:rPr kumimoji="0" lang="en-US" altLang="en-US" sz="1500" b="0" i="0" u="none" strike="noStrike" cap="none" normalizeH="0" baseline="0" dirty="0">
+                <a:ln>
+                  <a:noFill/>
+                </a:ln>
+                <a:solidFill>
+                  <a:srgbClr val="515151"/>
+                </a:solidFill>
+                <a:effectLst/>
+                <a:latin typeface="inherit"/>
+              </a:rPr>
+              <a:t>()</a:t>
+            </a:r>
+            <a:endParaRPr kumimoji="0" lang="en-US" altLang="en-US" sz="800" b="0" i="0" u="none" strike="noStrike" cap="none" normalizeH="0" baseline="0" dirty="0">
+              <a:ln>
+                <a:noFill/>
+              </a:ln>
+              <a:solidFill>
+                <a:schemeClr val="tx1"/>
+              </a:solidFill>
+              <a:effectLst/>
+            </a:endParaRPr>
+          </a:p>
+          <a:p>
+            <a:pPr marL="0" marR="0" lvl="0" indent="0" algn="l" defTabSz="914400" rtl="0" eaLnBrk="0" fontAlgn="base" latinLnBrk="0" hangingPunct="0">
+              <a:lnSpc>
+                <a:spcPct val="100000"/>
+              </a:lnSpc>
+              <a:spcBef>
+                <a:spcPct val="0"/>
+              </a:spcBef>
+              <a:spcAft>
+                <a:spcPct val="0"/>
+              </a:spcAft>
+              <a:buClrTx/>
+              <a:buSzTx/>
+              <a:buFontTx/>
+              <a:buNone/>
+              <a:tabLst/>
+            </a:pPr>
+            <a:r>
+              <a:rPr kumimoji="0" lang="en-US" altLang="en-US" sz="1900" b="0" i="0" u="none" strike="noStrike" cap="none" normalizeH="0" baseline="0" dirty="0">
+                <a:ln>
+                  <a:noFill/>
+                </a:ln>
+                <a:solidFill>
+                  <a:schemeClr val="tx1"/>
+                </a:solidFill>
+                <a:effectLst/>
+                <a:latin typeface="inherit"/>
+              </a:rPr>
+              <a:t>  </a:t>
+            </a:r>
+            <a:endParaRPr kumimoji="0" lang="en-US" altLang="en-US" sz="23600" b="0" i="0" u="none" strike="noStrike" cap="none" normalizeH="0" baseline="0" dirty="0">
+              <a:ln>
+                <a:noFill/>
+              </a:ln>
+              <a:solidFill>
+                <a:schemeClr val="tx1"/>
+              </a:solidFill>
+              <a:effectLst/>
+              <a:latin typeface="inherit"/>
+            </a:endParaRPr>
+          </a:p>
+        </p:txBody>
+      </p:sp>
+      <p:pic>
+        <p:nvPicPr>
+          <p:cNvPr id="3074" name="Picture 2">
+            <a:extLst>
+              <a:ext uri="{FF2B5EF4-FFF2-40B4-BE49-F238E27FC236}">
+                <a16:creationId xmlns:a16="http://schemas.microsoft.com/office/drawing/2014/main" id="{35070819-8060-DC47-807B-549DC7F63CDF}"/>
+              </a:ext>
+            </a:extLst>
+          </p:cNvPr>
+          <p:cNvPicPr>
+            <a:picLocks noChangeAspect="1" noChangeArrowheads="1"/>
+          </p:cNvPicPr>
+          <p:nvPr/>
+        </p:nvPicPr>
+        <p:blipFill>
+          <a:blip r:embed="rId2">
+            <a:extLst>
+              <a:ext uri="{28A0092B-C50C-407E-A947-70E740481C1C}">
+                <a14:useLocalDpi xmlns:a14="http://schemas.microsoft.com/office/drawing/2010/main" val="0"/>
+              </a:ext>
+            </a:extLst>
+          </a:blip>
+          <a:srcRect/>
+          <a:stretch>
+            <a:fillRect/>
+          </a:stretch>
+        </p:blipFill>
+        <p:spPr bwMode="auto">
+          <a:xfrm>
+            <a:off x="1524000" y="3098800"/>
+            <a:ext cx="6096000" cy="3759200"/>
+          </a:xfrm>
+          <a:prstGeom prst="rect">
+            <a:avLst/>
+          </a:prstGeom>
+          <a:noFill/>
+          <a:extLst>
+            <a:ext uri="{909E8E84-426E-40DD-AFC4-6F175D3DCCD1}">
+              <a14:hiddenFill xmlns:a14="http://schemas.microsoft.com/office/drawing/2010/main">
+                <a:solidFill>
+                  <a:srgbClr val="FFFFFF"/>
+                </a:solidFill>
+              </a14:hiddenFill>
+            </a:ext>
+          </a:extLst>
+        </p:spPr>
+      </p:pic>
+    </p:spTree>
+    <p:extLst>
+      <p:ext uri="{BB962C8B-B14F-4D97-AF65-F5344CB8AC3E}">
+        <p14:creationId xmlns:p14="http://schemas.microsoft.com/office/powerpoint/2010/main" val="3509120159"/>
+      </p:ext>
+    </p:extLst>
+  </p:cSld>
+  <p:clrMapOvr>
+    <a:masterClrMapping/>
+  </p:clrMapOvr>
+</p:sld>
+</file>
+
+<file path=ppt/slides/slide13.xml><?xml version="1.0" encoding="utf-8"?>
+<p:sld xmlns:a="http://schemas.openxmlformats.org/drawingml/2006/main" xmlns:r="http://schemas.openxmlformats.org/officeDocument/2006/relationships" xmlns:p="http://schemas.openxmlformats.org/presentationml/2006/main">
+  <p:cSld>
+    <p:spTree>
+      <p:nvGrpSpPr>
+        <p:cNvPr id="1" name=""/>
+        <p:cNvGrpSpPr/>
+        <p:nvPr/>
+      </p:nvGrpSpPr>
+      <p:grpSpPr>
+        <a:xfrm>
+          <a:off x="0" y="0"/>
+          <a:ext cx="0" cy="0"/>
+          <a:chOff x="0" y="0"/>
+          <a:chExt cx="0" cy="0"/>
+        </a:xfrm>
+      </p:grpSpPr>
+      <p:sp>
+        <p:nvSpPr>
           <p:cNvPr id="2" name="Title 1"/>
           <p:cNvSpPr>
             <a:spLocks noGrp="1"/>
@@ -5193,7 +7112,7 @@
           <a:p>
             <a:r>
               <a:rPr lang="en-US" dirty="0"/>
-              <a:t>Other packages to explore</a:t>
+              <a:t>3. Produce predictor data </a:t>
             </a:r>
           </a:p>
         </p:txBody>
@@ -5206,12 +7125,407 @@
           </p:cNvSpPr>
           <p:nvPr>
             <p:ph idx="1"/>
+          </p:nvPr>
+        </p:nvSpPr>
+        <p:spPr/>
+        <p:txBody>
+          <a:bodyPr>
+            <a:normAutofit/>
+          </a:bodyPr>
+          <a:lstStyle/>
+          <a:p>
+            <a:r>
+              <a:rPr lang="en-US" sz="2400" dirty="0"/>
+              <a:t>Useful functions: </a:t>
+            </a:r>
+          </a:p>
+          <a:p>
+            <a:pPr lvl="1"/>
+            <a:r>
+              <a:rPr lang="en-US" sz="2000" dirty="0"/>
+              <a:t>rep() </a:t>
+            </a:r>
+          </a:p>
+          <a:p>
+            <a:pPr lvl="1"/>
+            <a:r>
+              <a:rPr lang="en-US" sz="2000" dirty="0" err="1"/>
+              <a:t>expand.grid</a:t>
+            </a:r>
+            <a:r>
+              <a:rPr lang="en-US" sz="2000" dirty="0"/>
+              <a:t>()</a:t>
+            </a:r>
+          </a:p>
+          <a:p>
+            <a:pPr lvl="1"/>
+            <a:r>
+              <a:rPr lang="en-US" sz="2000" dirty="0" err="1"/>
+              <a:t>seq</a:t>
+            </a:r>
+            <a:r>
+              <a:rPr lang="en-US" sz="2000" dirty="0"/>
+              <a:t>()</a:t>
+            </a:r>
+          </a:p>
+          <a:p>
+            <a:pPr lvl="1"/>
+            <a:r>
+              <a:rPr lang="en-US" sz="2000" dirty="0" err="1"/>
+              <a:t>runif</a:t>
+            </a:r>
+            <a:r>
+              <a:rPr lang="en-US" sz="2000" dirty="0"/>
+              <a:t>()</a:t>
+            </a:r>
+          </a:p>
+          <a:p>
+            <a:pPr lvl="1"/>
+            <a:endParaRPr lang="en-US" sz="2000" dirty="0"/>
+          </a:p>
+        </p:txBody>
+      </p:sp>
+    </p:spTree>
+    <p:extLst>
+      <p:ext uri="{BB962C8B-B14F-4D97-AF65-F5344CB8AC3E}">
+        <p14:creationId xmlns:p14="http://schemas.microsoft.com/office/powerpoint/2010/main" val="3560906909"/>
+      </p:ext>
+    </p:extLst>
+  </p:cSld>
+  <p:clrMapOvr>
+    <a:masterClrMapping/>
+  </p:clrMapOvr>
+</p:sld>
+</file>
+
+<file path=ppt/slides/slide14.xml><?xml version="1.0" encoding="utf-8"?>
+<p:sld xmlns:a="http://schemas.openxmlformats.org/drawingml/2006/main" xmlns:r="http://schemas.openxmlformats.org/officeDocument/2006/relationships" xmlns:p="http://schemas.openxmlformats.org/presentationml/2006/main">
+  <p:cSld>
+    <p:spTree>
+      <p:nvGrpSpPr>
+        <p:cNvPr id="1" name=""/>
+        <p:cNvGrpSpPr/>
+        <p:nvPr/>
+      </p:nvGrpSpPr>
+      <p:grpSpPr>
+        <a:xfrm>
+          <a:off x="0" y="0"/>
+          <a:ext cx="0" cy="0"/>
+          <a:chOff x="0" y="0"/>
+          <a:chExt cx="0" cy="0"/>
+        </a:xfrm>
+      </p:grpSpPr>
+      <p:sp>
+        <p:nvSpPr>
+          <p:cNvPr id="2" name="Title 1"/>
+          <p:cNvSpPr>
+            <a:spLocks noGrp="1"/>
+          </p:cNvSpPr>
+          <p:nvPr>
+            <p:ph type="title"/>
           </p:nvPr>
         </p:nvSpPr>
         <p:spPr/>
         <p:txBody>
           <a:bodyPr/>
           <a:lstStyle/>
+          <a:p>
+            <a:r>
+              <a:rPr lang="en-US" dirty="0"/>
+              <a:t>rep()</a:t>
+            </a:r>
+          </a:p>
+        </p:txBody>
+      </p:sp>
+      <p:sp>
+        <p:nvSpPr>
+          <p:cNvPr id="3" name="Content Placeholder 2"/>
+          <p:cNvSpPr>
+            <a:spLocks noGrp="1"/>
+          </p:cNvSpPr>
+          <p:nvPr>
+            <p:ph idx="1"/>
+          </p:nvPr>
+        </p:nvSpPr>
+        <p:spPr/>
+        <p:txBody>
+          <a:bodyPr>
+            <a:normAutofit/>
+          </a:bodyPr>
+          <a:lstStyle/>
+          <a:p>
+            <a:pPr lvl="1"/>
+            <a:r>
+              <a:rPr lang="en-US" sz="2000" dirty="0"/>
+              <a:t>Use c(“a”, “b”, “c”.....) </a:t>
+            </a:r>
+          </a:p>
+          <a:p>
+            <a:pPr lvl="1"/>
+            <a:r>
+              <a:rPr lang="en-US" sz="2000" dirty="0"/>
+              <a:t>Each = # of times you rep each one</a:t>
+            </a:r>
+          </a:p>
+          <a:p>
+            <a:pPr lvl="1"/>
+            <a:r>
+              <a:rPr lang="en-US" sz="2000" dirty="0"/>
+              <a:t>Times = number of times you rep the whole vector</a:t>
+            </a:r>
+          </a:p>
+          <a:p>
+            <a:pPr lvl="1"/>
+            <a:r>
+              <a:rPr lang="en-US" sz="2000" dirty="0"/>
+              <a:t>Length = replicate until you get a vector of this length</a:t>
+            </a:r>
+          </a:p>
+          <a:p>
+            <a:pPr lvl="1"/>
+            <a:r>
+              <a:rPr lang="en-US" sz="2000" dirty="0"/>
+              <a:t>Need to use factor() around rep function to create a factor. </a:t>
+            </a:r>
+          </a:p>
+          <a:p>
+            <a:endParaRPr lang="en-US" sz="2400" dirty="0"/>
+          </a:p>
+        </p:txBody>
+      </p:sp>
+    </p:spTree>
+    <p:extLst>
+      <p:ext uri="{BB962C8B-B14F-4D97-AF65-F5344CB8AC3E}">
+        <p14:creationId xmlns:p14="http://schemas.microsoft.com/office/powerpoint/2010/main" val="3700533529"/>
+      </p:ext>
+    </p:extLst>
+  </p:cSld>
+  <p:clrMapOvr>
+    <a:masterClrMapping/>
+  </p:clrMapOvr>
+</p:sld>
+</file>
+
+<file path=ppt/slides/slide15.xml><?xml version="1.0" encoding="utf-8"?>
+<p:sld xmlns:a="http://schemas.openxmlformats.org/drawingml/2006/main" xmlns:r="http://schemas.openxmlformats.org/officeDocument/2006/relationships" xmlns:p="http://schemas.openxmlformats.org/presentationml/2006/main">
+  <p:cSld>
+    <p:spTree>
+      <p:nvGrpSpPr>
+        <p:cNvPr id="1" name=""/>
+        <p:cNvGrpSpPr/>
+        <p:nvPr/>
+      </p:nvGrpSpPr>
+      <p:grpSpPr>
+        <a:xfrm>
+          <a:off x="0" y="0"/>
+          <a:ext cx="0" cy="0"/>
+          <a:chOff x="0" y="0"/>
+          <a:chExt cx="0" cy="0"/>
+        </a:xfrm>
+      </p:grpSpPr>
+      <p:sp>
+        <p:nvSpPr>
+          <p:cNvPr id="2" name="Title 1"/>
+          <p:cNvSpPr>
+            <a:spLocks noGrp="1"/>
+          </p:cNvSpPr>
+          <p:nvPr>
+            <p:ph type="title"/>
+          </p:nvPr>
+        </p:nvSpPr>
+        <p:spPr/>
+        <p:txBody>
+          <a:bodyPr/>
+          <a:lstStyle/>
+          <a:p>
+            <a:r>
+              <a:rPr lang="en-US" dirty="0" err="1"/>
+              <a:t>Expand.grid</a:t>
+            </a:r>
+            <a:r>
+              <a:rPr lang="en-US" dirty="0"/>
+              <a:t>()</a:t>
+            </a:r>
+          </a:p>
+        </p:txBody>
+      </p:sp>
+      <p:sp>
+        <p:nvSpPr>
+          <p:cNvPr id="3" name="Content Placeholder 2"/>
+          <p:cNvSpPr>
+            <a:spLocks noGrp="1"/>
+          </p:cNvSpPr>
+          <p:nvPr>
+            <p:ph idx="1"/>
+          </p:nvPr>
+        </p:nvSpPr>
+        <p:spPr>
+          <a:xfrm>
+            <a:off x="1606045" y="2638045"/>
+            <a:ext cx="6676309" cy="3101983"/>
+          </a:xfrm>
+        </p:spPr>
+        <p:txBody>
+          <a:bodyPr>
+            <a:normAutofit lnSpcReduction="10000"/>
+          </a:bodyPr>
+          <a:lstStyle/>
+          <a:p>
+            <a:pPr marL="0" indent="0">
+              <a:buNone/>
+            </a:pPr>
+            <a:r>
+              <a:rPr lang="en-US" sz="2400" dirty="0" err="1"/>
+              <a:t>Expand.grid</a:t>
+            </a:r>
+            <a:r>
+              <a:rPr lang="en-US" sz="2400" dirty="0"/>
+              <a:t>(</a:t>
+            </a:r>
+          </a:p>
+          <a:p>
+            <a:pPr marL="0" indent="0">
+              <a:buNone/>
+            </a:pPr>
+            <a:r>
+              <a:rPr lang="en-US" sz="2400" dirty="0"/>
+              <a:t>  gender=c("M","F"),</a:t>
+            </a:r>
+          </a:p>
+          <a:p>
+            <a:pPr marL="228600" lvl="1" indent="0">
+              <a:buNone/>
+            </a:pPr>
+            <a:r>
+              <a:rPr lang="en-US" sz="2200" dirty="0"/>
+              <a:t>education=c("</a:t>
+            </a:r>
+            <a:r>
+              <a:rPr lang="en-US" sz="2200" dirty="0" err="1"/>
+              <a:t>HS","College","Advanced</a:t>
+            </a:r>
+            <a:r>
+              <a:rPr lang="en-US" sz="2200" dirty="0"/>
+              <a:t>"),</a:t>
+            </a:r>
+          </a:p>
+          <a:p>
+            <a:pPr marL="228600" lvl="1" indent="0">
+              <a:buNone/>
+            </a:pPr>
+            <a:r>
+              <a:rPr lang="en-US" sz="2200" dirty="0"/>
+              <a:t>status=c("</a:t>
+            </a:r>
+            <a:r>
+              <a:rPr lang="en-US" sz="2200" dirty="0" err="1"/>
+              <a:t>Single","Married","Divorced","Widowed</a:t>
+            </a:r>
+            <a:r>
+              <a:rPr lang="en-US" sz="2200" dirty="0"/>
+              <a:t>"))</a:t>
+            </a:r>
+          </a:p>
+          <a:p>
+            <a:pPr marL="228600" lvl="1" indent="0">
+              <a:buNone/>
+            </a:pPr>
+            <a:endParaRPr lang="en-US" sz="2200" dirty="0"/>
+          </a:p>
+          <a:p>
+            <a:pPr marL="228600" lvl="1" indent="0">
+              <a:buNone/>
+            </a:pPr>
+            <a:r>
+              <a:rPr lang="en-US" sz="2200" dirty="0"/>
+              <a:t>Gives you every possible combination of these variables. </a:t>
+            </a:r>
+          </a:p>
+        </p:txBody>
+      </p:sp>
+    </p:spTree>
+    <p:extLst>
+      <p:ext uri="{BB962C8B-B14F-4D97-AF65-F5344CB8AC3E}">
+        <p14:creationId xmlns:p14="http://schemas.microsoft.com/office/powerpoint/2010/main" val="2183772153"/>
+      </p:ext>
+    </p:extLst>
+  </p:cSld>
+  <p:clrMapOvr>
+    <a:masterClrMapping/>
+  </p:clrMapOvr>
+</p:sld>
+</file>
+
+<file path=ppt/slides/slide16.xml><?xml version="1.0" encoding="utf-8"?>
+<p:sld xmlns:a="http://schemas.openxmlformats.org/drawingml/2006/main" xmlns:r="http://schemas.openxmlformats.org/officeDocument/2006/relationships" xmlns:p="http://schemas.openxmlformats.org/presentationml/2006/main">
+  <p:cSld>
+    <p:spTree>
+      <p:nvGrpSpPr>
+        <p:cNvPr id="1" name=""/>
+        <p:cNvGrpSpPr/>
+        <p:nvPr/>
+      </p:nvGrpSpPr>
+      <p:grpSpPr>
+        <a:xfrm>
+          <a:off x="0" y="0"/>
+          <a:ext cx="0" cy="0"/>
+          <a:chOff x="0" y="0"/>
+          <a:chExt cx="0" cy="0"/>
+        </a:xfrm>
+      </p:grpSpPr>
+      <p:sp>
+        <p:nvSpPr>
+          <p:cNvPr id="2" name="Title 1"/>
+          <p:cNvSpPr>
+            <a:spLocks noGrp="1"/>
+          </p:cNvSpPr>
+          <p:nvPr>
+            <p:ph type="title"/>
+          </p:nvPr>
+        </p:nvSpPr>
+        <p:spPr/>
+        <p:txBody>
+          <a:bodyPr/>
+          <a:lstStyle/>
+          <a:p>
+            <a:r>
+              <a:rPr lang="en-US" dirty="0"/>
+              <a:t>Other packages to explore</a:t>
+            </a:r>
+          </a:p>
+        </p:txBody>
+      </p:sp>
+      <p:sp>
+        <p:nvSpPr>
+          <p:cNvPr id="3" name="Content Placeholder 2"/>
+          <p:cNvSpPr>
+            <a:spLocks noGrp="1"/>
+          </p:cNvSpPr>
+          <p:nvPr>
+            <p:ph idx="1"/>
+          </p:nvPr>
+        </p:nvSpPr>
+        <p:spPr/>
+        <p:txBody>
+          <a:bodyPr/>
+          <a:lstStyle/>
+          <a:p>
+            <a:r>
+              <a:rPr lang="en-US" dirty="0">
+                <a:hlinkClick r:id="rId2"/>
+              </a:rPr>
+              <a:t>Simstudy- simulate study data</a:t>
+            </a:r>
+          </a:p>
+          <a:p>
+            <a:pPr lvl="1"/>
+            <a:r>
+              <a:rPr lang="en-US" dirty="0">
+                <a:hlinkClick r:id="rId2"/>
+              </a:rPr>
+              <a:t>https://cran.r-project.org/web/packages/simstudy/vignettes/simstudy.html</a:t>
+            </a:r>
+          </a:p>
           <a:p>
             <a:r>
               <a:rPr lang="en-US" dirty="0">
@@ -5288,26 +7602,33 @@
             <p:ph idx="1"/>
           </p:nvPr>
         </p:nvSpPr>
-        <p:spPr/>
-        <p:txBody>
-          <a:bodyPr/>
+        <p:spPr>
+          <a:xfrm>
+            <a:off x="1107831" y="2638045"/>
+            <a:ext cx="6646984" cy="3101983"/>
+          </a:xfrm>
+        </p:spPr>
+        <p:txBody>
+          <a:bodyPr>
+            <a:normAutofit/>
+          </a:bodyPr>
           <a:lstStyle/>
           <a:p>
             <a:r>
-              <a:rPr lang="en-US" dirty="0"/>
+              <a:rPr lang="en-US" sz="2400" dirty="0"/>
               <a:t>Produce data to play around with. </a:t>
             </a:r>
           </a:p>
           <a:p>
             <a:r>
-              <a:rPr lang="en-US" dirty="0"/>
+              <a:rPr lang="en-US" sz="2400" dirty="0"/>
               <a:t>Generate data similar to what we expect to collect to see if our proposed analysis works as expected.</a:t>
             </a:r>
           </a:p>
           <a:p>
             <a:r>
-              <a:rPr lang="en-US" dirty="0"/>
-              <a:t>Power analysis</a:t>
+              <a:rPr lang="en-US" sz="2400" dirty="0"/>
+              <a:t>Run a power analysis to determine necessary sample size</a:t>
             </a:r>
           </a:p>
         </p:txBody>
@@ -5376,7 +7697,9 @@
         </p:nvSpPr>
         <p:spPr/>
         <p:txBody>
-          <a:bodyPr/>
+          <a:bodyPr>
+            <a:normAutofit/>
+          </a:bodyPr>
           <a:lstStyle/>
           <a:p>
             <a:pPr marL="514350" indent="-514350">
@@ -5384,7 +7707,7 @@
               <a:buAutoNum type="arabicPeriod"/>
             </a:pPr>
             <a:r>
-              <a:rPr lang="en-US" dirty="0"/>
+              <a:rPr lang="en-US" sz="2400" dirty="0"/>
               <a:t>Define your expected dataset </a:t>
             </a:r>
           </a:p>
@@ -5394,8 +7717,16 @@
               <a:buAutoNum type="arabicPeriod"/>
             </a:pPr>
             <a:r>
-              <a:rPr lang="en-US" dirty="0"/>
-              <a:t>Use a random draw from appropriate probability distribution to produce response variable</a:t>
+              <a:rPr lang="en-US" sz="2400" dirty="0"/>
+              <a:t>Produce </a:t>
+            </a:r>
+            <a:r>
+              <a:rPr lang="en-US" sz="2400" b="1" dirty="0"/>
+              <a:t>Response</a:t>
+            </a:r>
+            <a:r>
+              <a:rPr lang="en-US" sz="2400" dirty="0"/>
+              <a:t> variable using a random draw from appropriate probability distribution </a:t>
             </a:r>
           </a:p>
           <a:p>
@@ -5404,12 +7735,20 @@
               <a:buAutoNum type="arabicPeriod"/>
             </a:pPr>
             <a:r>
-              <a:rPr lang="en-US" dirty="0"/>
-              <a:t>Produce predictor data</a:t>
-            </a:r>
-          </a:p>
-          <a:p>
-            <a:endParaRPr lang="en-US" dirty="0"/>
+              <a:rPr lang="en-US" sz="2400" dirty="0"/>
+              <a:t>Produce </a:t>
+            </a:r>
+            <a:r>
+              <a:rPr lang="en-US" sz="2400" b="1" dirty="0"/>
+              <a:t>Predictor</a:t>
+            </a:r>
+            <a:r>
+              <a:rPr lang="en-US" sz="2400" dirty="0"/>
+              <a:t> data</a:t>
+            </a:r>
+          </a:p>
+          <a:p>
+            <a:endParaRPr lang="en-US" sz="2400" dirty="0"/>
           </a:p>
         </p:txBody>
       </p:sp>
@@ -5477,31 +7816,33 @@
         </p:nvSpPr>
         <p:spPr/>
         <p:txBody>
-          <a:bodyPr/>
+          <a:bodyPr>
+            <a:normAutofit/>
+          </a:bodyPr>
           <a:lstStyle/>
           <a:p>
             <a:pPr lvl="1"/>
             <a:r>
-              <a:rPr lang="en-US" dirty="0"/>
-              <a:t>What is your response &amp; predictors? </a:t>
+              <a:rPr lang="en-US" sz="2000" dirty="0"/>
+              <a:t>What are your response &amp; predictors? </a:t>
             </a:r>
           </a:p>
           <a:p>
             <a:pPr lvl="1"/>
             <a:r>
-              <a:rPr lang="en-US" dirty="0"/>
+              <a:rPr lang="en-US" sz="2000" dirty="0"/>
               <a:t>What is the anticipated error distribution of your response? </a:t>
             </a:r>
           </a:p>
           <a:p>
             <a:pPr lvl="1"/>
             <a:r>
-              <a:rPr lang="en-US" dirty="0"/>
+              <a:rPr lang="en-US" sz="2000" dirty="0"/>
               <a:t>How many samples will you have? How are these apportioned to each category of predictor? </a:t>
             </a:r>
           </a:p>
           <a:p>
-            <a:endParaRPr lang="en-US" dirty="0"/>
+            <a:endParaRPr lang="en-US" sz="2400" dirty="0"/>
           </a:p>
         </p:txBody>
       </p:sp>
@@ -5569,28 +7910,30 @@
         </p:nvSpPr>
         <p:spPr/>
         <p:txBody>
-          <a:bodyPr/>
+          <a:bodyPr>
+            <a:normAutofit/>
+          </a:bodyPr>
           <a:lstStyle/>
           <a:p>
             <a:r>
-              <a:rPr lang="en-US" dirty="0"/>
+              <a:rPr lang="en-US" sz="2400" dirty="0"/>
               <a:t>Use a random draw from appropriate probability distribution to produce response variable</a:t>
             </a:r>
           </a:p>
           <a:p>
             <a:r>
-              <a:rPr lang="en-US" dirty="0"/>
+              <a:rPr lang="en-US" sz="2400" dirty="0"/>
               <a:t>If you have pilot data, you can use this to estimate parameters to use for the random draw. </a:t>
             </a:r>
           </a:p>
           <a:p>
             <a:r>
-              <a:rPr lang="en-US" dirty="0"/>
+              <a:rPr lang="en-US" sz="2400" dirty="0"/>
               <a:t>Otherwise, need to use best guess</a:t>
             </a:r>
           </a:p>
           <a:p>
-            <a:endParaRPr lang="en-US" dirty="0"/>
+            <a:endParaRPr lang="en-US" sz="2400" dirty="0"/>
           </a:p>
         </p:txBody>
       </p:sp>
@@ -5840,7 +8183,13 @@
       </p:grpSpPr>
       <p:sp>
         <p:nvSpPr>
-          <p:cNvPr id="2" name="Title 1"/>
+          <p:cNvPr id="2" name="Title 1">
+            <a:extLst>
+              <a:ext uri="{FF2B5EF4-FFF2-40B4-BE49-F238E27FC236}">
+                <a16:creationId xmlns:a16="http://schemas.microsoft.com/office/drawing/2014/main" id="{D5D1D928-02B2-B841-B331-CA2812417080}"/>
+              </a:ext>
+            </a:extLst>
+          </p:cNvPr>
           <p:cNvSpPr>
             <a:spLocks noGrp="1"/>
           </p:cNvSpPr>
@@ -5848,26 +8197,27 @@
             <p:ph type="title"/>
           </p:nvPr>
         </p:nvSpPr>
-        <p:spPr>
-          <a:xfrm>
-            <a:off x="158767" y="38100"/>
-            <a:ext cx="8811581" cy="1143000"/>
-          </a:xfrm>
-        </p:spPr>
+        <p:spPr/>
         <p:txBody>
           <a:bodyPr/>
           <a:lstStyle/>
           <a:p>
             <a:r>
               <a:rPr lang="en-US" dirty="0"/>
-              <a:t>Using probability functions in R</a:t>
-            </a:r>
-          </a:p>
-        </p:txBody>
-      </p:sp>
-      <p:sp>
-        <p:nvSpPr>
-          <p:cNvPr id="3" name="Content Placeholder 2"/>
+              <a:t>Probability Distributions</a:t>
+            </a:r>
+          </a:p>
+        </p:txBody>
+      </p:sp>
+      <p:sp>
+        <p:nvSpPr>
+          <p:cNvPr id="3" name="Content Placeholder 2">
+            <a:extLst>
+              <a:ext uri="{FF2B5EF4-FFF2-40B4-BE49-F238E27FC236}">
+                <a16:creationId xmlns:a16="http://schemas.microsoft.com/office/drawing/2014/main" id="{8EBA33A6-0DBA-C54C-93FC-FD54C45D4AAB}"/>
+              </a:ext>
+            </a:extLst>
+          </p:cNvPr>
           <p:cNvSpPr>
             <a:spLocks noGrp="1"/>
           </p:cNvSpPr>
@@ -5875,67 +8225,89 @@
             <p:ph idx="1"/>
           </p:nvPr>
         </p:nvSpPr>
-        <p:spPr>
-          <a:xfrm>
-            <a:off x="436610" y="1371600"/>
-            <a:ext cx="8017745" cy="3588979"/>
-          </a:xfrm>
-        </p:spPr>
+        <p:spPr/>
         <p:txBody>
           <a:bodyPr>
             <a:normAutofit/>
           </a:bodyPr>
           <a:lstStyle/>
           <a:p>
+            <a:pPr fontAlgn="base"/>
             <a:r>
               <a:rPr lang="en-US" sz="2400" dirty="0"/>
-              <a:t>dxxx(x,) returns the density or the value on the y-axis of a probability distribution for a discrete value of x</a:t>
-            </a:r>
-          </a:p>
-          <a:p>
-            <a:r>
-              <a:rPr lang="en-US" sz="2400" dirty="0" err="1"/>
-              <a:t>pxxx</a:t>
-            </a:r>
-            <a:r>
-              <a:rPr lang="en-US" sz="2400" dirty="0"/>
-              <a:t>(q,) returns the cumulative density function (CDF) or the area under the curve to the left of an x value on a probability distribution curve</a:t>
-            </a:r>
-          </a:p>
-          <a:p>
-            <a:r>
-              <a:rPr lang="en-US" sz="2400" dirty="0" err="1"/>
-              <a:t>qxxx</a:t>
-            </a:r>
-            <a:r>
-              <a:rPr lang="en-US" sz="2400" dirty="0"/>
-              <a:t>(p,) returns the </a:t>
-            </a:r>
-            <a:r>
-              <a:rPr lang="en-US" sz="2400" dirty="0" err="1"/>
-              <a:t>quantile</a:t>
-            </a:r>
-            <a:r>
-              <a:rPr lang="en-US" sz="2400" dirty="0"/>
-              <a:t> value, i.e. the standardized z value for x</a:t>
-            </a:r>
-          </a:p>
-          <a:p>
-            <a:r>
-              <a:rPr lang="en-US" sz="2400" dirty="0" err="1"/>
-              <a:t>rxxx</a:t>
-            </a:r>
-            <a:r>
-              <a:rPr lang="en-US" sz="2400" dirty="0"/>
-              <a:t>(n,) returns a random simulation of size n</a:t>
-            </a:r>
+              <a:t>Most commonly used:</a:t>
+            </a:r>
+          </a:p>
+          <a:p>
+            <a:pPr lvl="1" fontAlgn="base"/>
+            <a:r>
+              <a:rPr lang="en-US" sz="2000" i="1" dirty="0" err="1"/>
+              <a:t>rnorm</a:t>
+            </a:r>
+            <a:r>
+              <a:rPr lang="en-US" sz="2000" i="1" dirty="0"/>
+              <a:t>(n, mean, </a:t>
+            </a:r>
+            <a:r>
+              <a:rPr lang="en-US" sz="2000" i="1" dirty="0" err="1"/>
+              <a:t>sd</a:t>
+            </a:r>
+            <a:r>
+              <a:rPr lang="en-US" sz="2000" i="1" dirty="0"/>
+              <a:t>)</a:t>
+            </a:r>
+            <a:r>
+              <a:rPr lang="en-US" sz="2000" dirty="0"/>
+              <a:t> for continuous outcomes</a:t>
+            </a:r>
+          </a:p>
+          <a:p>
+            <a:pPr lvl="1" fontAlgn="base"/>
+            <a:r>
+              <a:rPr lang="en-US" sz="2000" i="1" dirty="0" err="1"/>
+              <a:t>rpois</a:t>
+            </a:r>
+            <a:r>
+              <a:rPr lang="en-US" sz="2000" i="1" dirty="0"/>
+              <a:t>(n, lambda)</a:t>
+            </a:r>
+            <a:r>
+              <a:rPr lang="en-US" sz="2000" dirty="0"/>
+              <a:t> for count outcomes</a:t>
+            </a:r>
+          </a:p>
+          <a:p>
+            <a:pPr lvl="1" fontAlgn="base"/>
+            <a:r>
+              <a:rPr lang="en-US" sz="2000" i="1" dirty="0" err="1"/>
+              <a:t>rbinom</a:t>
+            </a:r>
+            <a:r>
+              <a:rPr lang="en-US" sz="2000" i="1" dirty="0"/>
+              <a:t>(n, size = 1, </a:t>
+            </a:r>
+            <a:r>
+              <a:rPr lang="en-US" sz="2000" i="1" dirty="0" err="1"/>
+              <a:t>prob</a:t>
+            </a:r>
+            <a:r>
+              <a:rPr lang="en-US" sz="2000" i="1" dirty="0"/>
+              <a:t>)</a:t>
+            </a:r>
+            <a:r>
+              <a:rPr lang="en-US" sz="2000" dirty="0"/>
+              <a:t> binary outcomes</a:t>
+            </a:r>
+          </a:p>
+          <a:p>
+            <a:endParaRPr lang="en-US" dirty="0"/>
           </a:p>
         </p:txBody>
       </p:sp>
     </p:spTree>
     <p:extLst>
       <p:ext uri="{BB962C8B-B14F-4D97-AF65-F5344CB8AC3E}">
-        <p14:creationId xmlns:p14="http://schemas.microsoft.com/office/powerpoint/2010/main" val="847950640"/>
+        <p14:creationId xmlns:p14="http://schemas.microsoft.com/office/powerpoint/2010/main" val="1397856547"/>
       </p:ext>
     </p:extLst>
   </p:cSld>
@@ -5974,8 +8346,8 @@
         </p:nvSpPr>
         <p:spPr>
           <a:xfrm>
-            <a:off x="1603122" y="313528"/>
-            <a:ext cx="5937755" cy="1188720"/>
+            <a:off x="158767" y="38100"/>
+            <a:ext cx="8811581" cy="1143000"/>
           </a:xfrm>
         </p:spPr>
         <p:txBody>
@@ -5984,7 +8356,7 @@
           <a:p>
             <a:r>
               <a:rPr lang="en-US" dirty="0"/>
-              <a:t>Probability functions</a:t>
+              <a:t>Using probability functions in R</a:t>
             </a:r>
           </a:p>
         </p:txBody>
@@ -6001,130 +8373,65 @@
         </p:nvSpPr>
         <p:spPr>
           <a:xfrm>
-            <a:off x="685799" y="1981200"/>
-            <a:ext cx="8225011" cy="4114800"/>
+            <a:off x="436610" y="1371600"/>
+            <a:ext cx="8017745" cy="3588979"/>
           </a:xfrm>
         </p:spPr>
         <p:txBody>
           <a:bodyPr>
-            <a:normAutofit fontScale="92500" lnSpcReduction="20000"/>
+            <a:normAutofit/>
           </a:bodyPr>
           <a:lstStyle/>
           <a:p>
             <a:r>
+              <a:rPr lang="en-US" sz="2400" dirty="0"/>
+              <a:t>dxxx(x,) returns the density or the value on the y-axis of a probability distribution for a discrete value of x</a:t>
+            </a:r>
+          </a:p>
+          <a:p>
+            <a:r>
               <a:rPr lang="en-US" sz="2400" dirty="0" err="1"/>
-              <a:t>rnorm</a:t>
+              <a:t>pxxx</a:t>
             </a:r>
             <a:r>
               <a:rPr lang="en-US" sz="2400" dirty="0"/>
-              <a:t>(n = 10, mean = 50, </a:t>
-            </a:r>
+              <a:t>(q,) returns the cumulative density function (CDF) or the area under the curve to the left of an x value on a probability distribution curve</a:t>
+            </a:r>
+          </a:p>
+          <a:p>
             <a:r>
               <a:rPr lang="en-US" sz="2400" dirty="0" err="1"/>
-              <a:t>sd</a:t>
+              <a:t>qxxx</a:t>
             </a:r>
             <a:r>
               <a:rPr lang="en-US" sz="2400" dirty="0"/>
-              <a:t> = 19) # normal distribution</a:t>
-            </a:r>
-          </a:p>
-          <a:p>
+              <a:t>(p,) returns the </a:t>
+            </a:r>
             <a:r>
               <a:rPr lang="en-US" sz="2400" dirty="0" err="1"/>
-              <a:t>runif</a:t>
+              <a:t>quantile</a:t>
             </a:r>
             <a:r>
               <a:rPr lang="en-US" sz="2400" dirty="0"/>
-              <a:t>(n = 10, min = 0, max = 1) #uniform distribution</a:t>
-            </a:r>
-          </a:p>
-          <a:p>
-            <a:r>
-              <a:rPr lang="en-US" sz="2400" dirty="0" err="1"/>
-              <a:t>rpois</a:t>
-            </a:r>
-            <a:r>
-              <a:rPr lang="en-US" sz="2400" dirty="0"/>
-              <a:t>(n = 10, lambda = 15) # Poisson distribution, lambda = mean/variance</a:t>
-            </a:r>
-          </a:p>
-          <a:p>
-            <a:endParaRPr lang="en-US" sz="2400" dirty="0"/>
-          </a:p>
-          <a:p>
-            <a:r>
-              <a:rPr lang="en-US" sz="2400" dirty="0"/>
-              <a:t># toss coin 8 times using binomial distribution</a:t>
-            </a:r>
-          </a:p>
-          <a:p>
-            <a:r>
-              <a:rPr lang="tr-TR" sz="2400" dirty="0" err="1"/>
-              <a:t>rbinom</a:t>
-            </a:r>
-            <a:r>
-              <a:rPr lang="tr-TR" sz="2400" dirty="0"/>
-              <a:t>(n = 8, size = 1, p = 0.5)</a:t>
-            </a:r>
-          </a:p>
-          <a:p>
-            <a:endParaRPr lang="tr-TR" sz="2400" dirty="0"/>
-          </a:p>
-          <a:p>
-            <a:r>
-              <a:rPr lang="tr-TR" sz="2400" dirty="0"/>
-              <a:t># 18 </a:t>
-            </a:r>
-            <a:r>
-              <a:rPr lang="tr-TR" sz="2400" dirty="0" err="1"/>
-              <a:t>trials</a:t>
-            </a:r>
-            <a:r>
-              <a:rPr lang="tr-TR" sz="2400" dirty="0"/>
-              <a:t>, </a:t>
-            </a:r>
-            <a:r>
-              <a:rPr lang="tr-TR" sz="2400" dirty="0" err="1"/>
-              <a:t>sample</a:t>
-            </a:r>
-            <a:r>
-              <a:rPr lang="tr-TR" sz="2400" dirty="0"/>
-              <a:t> size 10, </a:t>
-            </a:r>
-            <a:r>
-              <a:rPr lang="tr-TR" sz="2400" dirty="0" err="1"/>
-              <a:t>prob</a:t>
-            </a:r>
-            <a:r>
-              <a:rPr lang="tr-TR" sz="2400" dirty="0"/>
-              <a:t> </a:t>
-            </a:r>
-            <a:r>
-              <a:rPr lang="tr-TR" sz="2400" dirty="0" err="1"/>
-              <a:t>success</a:t>
-            </a:r>
-            <a:r>
-              <a:rPr lang="tr-TR" sz="2400" dirty="0"/>
-              <a:t> =.2 </a:t>
-            </a:r>
-          </a:p>
-          <a:p>
-            <a:r>
-              <a:rPr lang="tr-TR" sz="2400" dirty="0" err="1"/>
-              <a:t>rbinom</a:t>
-            </a:r>
-            <a:r>
-              <a:rPr lang="tr-TR" sz="2400" dirty="0"/>
-              <a:t>(18, 10, 0.2)</a:t>
-            </a:r>
-            <a:endParaRPr lang="en-US" sz="2400" dirty="0"/>
+              <a:t> value, i.e. the standardized z value for x</a:t>
+            </a:r>
+          </a:p>
+          <a:p>
+            <a:r>
+              <a:rPr lang="en-US" sz="2400" b="1" dirty="0" err="1"/>
+              <a:t>rxxx</a:t>
+            </a:r>
+            <a:r>
+              <a:rPr lang="en-US" sz="2400" b="1" dirty="0"/>
+              <a:t>(n,) returns a random simulation of size n</a:t>
+            </a:r>
           </a:p>
         </p:txBody>
       </p:sp>
     </p:spTree>
     <p:extLst>
       <p:ext uri="{BB962C8B-B14F-4D97-AF65-F5344CB8AC3E}">
-        <p14:creationId xmlns:p14="http://schemas.microsoft.com/office/powerpoint/2010/main" val="1822993385"/>
+        <p14:creationId xmlns:p14="http://schemas.microsoft.com/office/powerpoint/2010/main" val="847950640"/>
       </p:ext>
     </p:extLst>
   </p:cSld>
@@ -6161,14 +8468,19 @@
             <p:ph type="title"/>
           </p:nvPr>
         </p:nvSpPr>
-        <p:spPr/>
+        <p:spPr>
+          <a:xfrm>
+            <a:off x="1603122" y="313528"/>
+            <a:ext cx="5937755" cy="1188720"/>
+          </a:xfrm>
+        </p:spPr>
         <p:txBody>
           <a:bodyPr/>
           <a:lstStyle/>
           <a:p>
             <a:r>
               <a:rPr lang="en-US" dirty="0"/>
-              <a:t>3. Produce predictor data </a:t>
+              <a:t>Probability functions</a:t>
             </a:r>
           </a:p>
         </p:txBody>
@@ -6183,66 +8495,132 @@
             <p:ph idx="1"/>
           </p:nvPr>
         </p:nvSpPr>
-        <p:spPr/>
-        <p:txBody>
-          <a:bodyPr/>
+        <p:spPr>
+          <a:xfrm>
+            <a:off x="685799" y="1981200"/>
+            <a:ext cx="8225011" cy="4114800"/>
+          </a:xfrm>
+        </p:spPr>
+        <p:txBody>
+          <a:bodyPr>
+            <a:normAutofit fontScale="92500" lnSpcReduction="20000"/>
+          </a:bodyPr>
           <a:lstStyle/>
           <a:p>
             <a:r>
-              <a:rPr lang="en-US" dirty="0"/>
-              <a:t>Useful functions: </a:t>
-            </a:r>
-          </a:p>
-          <a:p>
-            <a:pPr lvl="1"/>
-            <a:r>
-              <a:rPr lang="en-US" dirty="0"/>
-              <a:t>rep() </a:t>
-            </a:r>
-          </a:p>
-          <a:p>
-            <a:pPr lvl="1"/>
-            <a:r>
-              <a:rPr lang="en-US" dirty="0" err="1"/>
-              <a:t>expand.grid</a:t>
-            </a:r>
-            <a:r>
-              <a:rPr lang="en-US" dirty="0"/>
-              <a:t>()</a:t>
-            </a:r>
-          </a:p>
-          <a:p>
-            <a:pPr lvl="1"/>
-            <a:r>
-              <a:rPr lang="en-US" dirty="0" err="1"/>
-              <a:t>seq</a:t>
-            </a:r>
-            <a:r>
-              <a:rPr lang="en-US" dirty="0"/>
-              <a:t>()</a:t>
-            </a:r>
-          </a:p>
-          <a:p>
-            <a:pPr lvl="1"/>
-            <a:r>
-              <a:rPr lang="en-US" dirty="0" err="1"/>
+              <a:rPr lang="en-US" sz="2400" dirty="0" err="1"/>
+              <a:t>rnorm</a:t>
+            </a:r>
+            <a:r>
+              <a:rPr lang="en-US" sz="2400" dirty="0"/>
+              <a:t>(n = 10, mean = 50, </a:t>
+            </a:r>
+            <a:r>
+              <a:rPr lang="en-US" sz="2400" dirty="0" err="1"/>
+              <a:t>sd</a:t>
+            </a:r>
+            <a:r>
+              <a:rPr lang="en-US" sz="2400" dirty="0"/>
+              <a:t> = 19) # normal distribution</a:t>
+            </a:r>
+          </a:p>
+          <a:p>
+            <a:r>
+              <a:rPr lang="en-US" sz="2400" dirty="0" err="1"/>
               <a:t>runif</a:t>
             </a:r>
             <a:r>
-              <a:rPr lang="en-US" dirty="0"/>
-              <a:t>()</a:t>
-            </a:r>
-          </a:p>
-          <a:p>
-            <a:pPr lvl="1"/>
-            <a:endParaRPr lang="en-US" dirty="0"/>
+              <a:rPr lang="en-US" sz="2400" dirty="0"/>
+              <a:t>(n = 10, min = 0, max = 1) #uniform distribution</a:t>
+            </a:r>
+          </a:p>
+          <a:p>
+            <a:r>
+              <a:rPr lang="en-US" sz="2400" dirty="0" err="1"/>
+              <a:t>rpois</a:t>
+            </a:r>
+            <a:r>
+              <a:rPr lang="en-US" sz="2400" dirty="0"/>
+              <a:t>(n = 10, lambda = 15) # Poisson distribution, lambda = mean/variance</a:t>
+            </a:r>
+          </a:p>
+          <a:p>
+            <a:endParaRPr lang="en-US" sz="2400" dirty="0"/>
+          </a:p>
+          <a:p>
+            <a:r>
+              <a:rPr lang="en-US" sz="2400" dirty="0"/>
+              <a:t># toss coin 8 times using binomial distribution</a:t>
+            </a:r>
+          </a:p>
+          <a:p>
+            <a:r>
+              <a:rPr lang="tr-TR" sz="2400" dirty="0" err="1"/>
+              <a:t>rbinom</a:t>
+            </a:r>
+            <a:r>
+              <a:rPr lang="tr-TR" sz="2400" dirty="0"/>
+              <a:t>(n = 8, size = 1, p = 0.5)</a:t>
+            </a:r>
+          </a:p>
+          <a:p>
+            <a:endParaRPr lang="tr-TR" sz="2400" dirty="0"/>
+          </a:p>
+          <a:p>
+            <a:r>
+              <a:rPr lang="tr-TR" sz="2400" dirty="0"/>
+              <a:t># 18 </a:t>
+            </a:r>
+            <a:r>
+              <a:rPr lang="tr-TR" sz="2400" dirty="0" err="1"/>
+              <a:t>trials</a:t>
+            </a:r>
+            <a:r>
+              <a:rPr lang="tr-TR" sz="2400" dirty="0"/>
+              <a:t>, </a:t>
+            </a:r>
+            <a:r>
+              <a:rPr lang="tr-TR" sz="2400" dirty="0" err="1"/>
+              <a:t>sample</a:t>
+            </a:r>
+            <a:r>
+              <a:rPr lang="tr-TR" sz="2400" dirty="0"/>
+              <a:t> size 10, </a:t>
+            </a:r>
+            <a:r>
+              <a:rPr lang="tr-TR" sz="2400" dirty="0" err="1"/>
+              <a:t>prob</a:t>
+            </a:r>
+            <a:r>
+              <a:rPr lang="tr-TR" sz="2400" dirty="0"/>
+              <a:t> </a:t>
+            </a:r>
+            <a:r>
+              <a:rPr lang="tr-TR" sz="2400" dirty="0" err="1"/>
+              <a:t>success</a:t>
+            </a:r>
+            <a:r>
+              <a:rPr lang="tr-TR" sz="2400" dirty="0"/>
+              <a:t> =.2 </a:t>
+            </a:r>
+          </a:p>
+          <a:p>
+            <a:r>
+              <a:rPr lang="tr-TR" sz="2400" dirty="0" err="1"/>
+              <a:t>rbinom</a:t>
+            </a:r>
+            <a:r>
+              <a:rPr lang="tr-TR" sz="2400" dirty="0"/>
+              <a:t>(18, 10, 0.2)</a:t>
+            </a:r>
+            <a:endParaRPr lang="en-US" sz="2400" dirty="0"/>
           </a:p>
         </p:txBody>
       </p:sp>
     </p:spTree>
     <p:extLst>
       <p:ext uri="{BB962C8B-B14F-4D97-AF65-F5344CB8AC3E}">
-        <p14:creationId xmlns:p14="http://schemas.microsoft.com/office/powerpoint/2010/main" val="3560906909"/>
+        <p14:creationId xmlns:p14="http://schemas.microsoft.com/office/powerpoint/2010/main" val="1822993385"/>
       </p:ext>
     </p:extLst>
   </p:cSld>

</xml_diff>